<commit_message>
fixed error in package name
</commit_message>
<xml_diff>
--- a/Examples/src/main/resources/com/aspose/slides/examples/SmartArt/ManageSmartArtStyle/changesmartart/ChangeSmartArtStyle.pptx
+++ b/Examples/src/main/resources/com/aspose/slides/examples/SmartArt/ManageSmartArtStyle/changesmartart/ChangeSmartArtStyle.pptx
@@ -1,6 +1,6 @@
 
 <file path=ppt/presentation.xml><?xml version="1.0" encoding="utf-8"?>
-<!--Generated by Aspose.Slides for Java 14.7.0.0-->
+<!--Generated by Aspose.Slides for Java 15.5.0.0-->
 <p:presentation xmlns:r="http://schemas.openxmlformats.org/officeDocument/2006/relationships" xmlns:a="http://schemas.openxmlformats.org/drawingml/2006/main" xmlns:p="http://schemas.openxmlformats.org/presentationml/2006/main" saveSubsetFonts="1">
   <p:sldMasterIdLst>
     <p:sldMasterId id="2147483648" r:id="rId1"/>
@@ -15,13 +15,16 @@
   </p:custDataLst>
   <p:defaultTextStyle>
     <a:defPPr>
-      <a:defRPr lang="en-US"/>
+      <a:defRPr lang="en-US">
+        <a:effectLst/>
+      </a:defRPr>
     </a:defPPr>
     <a:lvl1pPr marL="0" algn="l" defTabSz="914400" rtl="0" eaLnBrk="1" latinLnBrk="0" hangingPunct="1">
       <a:defRPr sz="1800" kern="1200">
         <a:solidFill>
           <a:schemeClr val="tx1"/>
         </a:solidFill>
+        <a:effectLst/>
         <a:latin typeface="+mn-lt"/>
         <a:ea typeface="+mn-ea"/>
         <a:cs typeface="+mn-cs"/>
@@ -32,6 +35,7 @@
         <a:solidFill>
           <a:schemeClr val="tx1"/>
         </a:solidFill>
+        <a:effectLst/>
         <a:latin typeface="+mn-lt"/>
         <a:ea typeface="+mn-ea"/>
         <a:cs typeface="+mn-cs"/>
@@ -42,6 +46,7 @@
         <a:solidFill>
           <a:schemeClr val="tx1"/>
         </a:solidFill>
+        <a:effectLst/>
         <a:latin typeface="+mn-lt"/>
         <a:ea typeface="+mn-ea"/>
         <a:cs typeface="+mn-cs"/>
@@ -52,6 +57,7 @@
         <a:solidFill>
           <a:schemeClr val="tx1"/>
         </a:solidFill>
+        <a:effectLst/>
         <a:latin typeface="+mn-lt"/>
         <a:ea typeface="+mn-ea"/>
         <a:cs typeface="+mn-cs"/>
@@ -62,6 +68,7 @@
         <a:solidFill>
           <a:schemeClr val="tx1"/>
         </a:solidFill>
+        <a:effectLst/>
         <a:latin typeface="+mn-lt"/>
         <a:ea typeface="+mn-ea"/>
         <a:cs typeface="+mn-cs"/>
@@ -72,6 +79,7 @@
         <a:solidFill>
           <a:schemeClr val="tx1"/>
         </a:solidFill>
+        <a:effectLst/>
         <a:latin typeface="+mn-lt"/>
         <a:ea typeface="+mn-ea"/>
         <a:cs typeface="+mn-cs"/>
@@ -82,6 +90,7 @@
         <a:solidFill>
           <a:schemeClr val="tx1"/>
         </a:solidFill>
+        <a:effectLst/>
         <a:latin typeface="+mn-lt"/>
         <a:ea typeface="+mn-ea"/>
         <a:cs typeface="+mn-cs"/>
@@ -92,6 +101,7 @@
         <a:solidFill>
           <a:schemeClr val="tx1"/>
         </a:solidFill>
+        <a:effectLst/>
         <a:latin typeface="+mn-lt"/>
         <a:ea typeface="+mn-ea"/>
         <a:cs typeface="+mn-cs"/>
@@ -102,6 +112,7 @@
         <a:solidFill>
           <a:schemeClr val="tx1"/>
         </a:solidFill>
+        <a:effectLst/>
         <a:latin typeface="+mn-lt"/>
         <a:ea typeface="+mn-ea"/>
         <a:cs typeface="+mn-cs"/>
@@ -862,24 +873,28 @@
 <dgm:dataModel xmlns:a="http://schemas.openxmlformats.org/drawingml/2006/main" xmlns:r="http://schemas.openxmlformats.org/officeDocument/2006/relationships" xmlns:dgm="http://schemas.openxmlformats.org/drawingml/2006/diagram">
   <dgm:ptLst>
     <dgm:pt modelId="{71788355-5C90-4EF2-B8CB-20B3607734AA}" type="doc">
-      <dgm:prSet loTypeId="urn:microsoft.com/office/officeart/2005/8/layout/default" loCatId="list" qsTypeId="urn:microsoft.com/office/officeart/2005/8/quickstyle/3d3" csTypeId="urn:microsoft.com/office/officeart/2005/8/colors/accent1_2" phldr="0"/>
+      <dgm:prSet loTypeId="urn:microsoft.com/office/officeart/2005/8/layout/default" loCatId="list" qsTypeId="urn:microsoft.com/office/officeart/2005/8/quickstyle/3d3" qsCatId="3D" csTypeId="urn:microsoft.com/office/officeart/2005/8/colors/accent1_2" phldr="0"/>
       <dgm:spPr/>
       <dgm:t>
         <a:bodyPr/>
         <a:lstStyle/>
         <a:p>
-          <a:endParaRPr lang="en-US"/>
+          <a:endParaRPr lang="en-US">
+            <a:effectLst/>
+          </a:endParaRPr>
         </a:p>
       </dgm:t>
     </dgm:pt>
-    <dgm:pt modelId="{5F45D818-FF2E-4103-B428-6BCDF4646EDC}" type="parTrans" cxnId="{BF824DE6-7E15-4433-BC43-8153227006DB}">
+    <dgm:pt modelId="{5F45D818-FF2E-4103-B428-6BCDF4646EDC}" type="parTrans" cxnId="{A1D32D32-0142-4DBC-A78F-E447219069DC}">
       <dgm:prSet/>
       <dgm:spPr/>
       <dgm:t>
         <a:bodyPr/>
         <a:lstStyle/>
         <a:p>
-          <a:endParaRPr lang="en-US"/>
+          <a:endParaRPr lang="en-US">
+            <a:effectLst/>
+          </a:endParaRPr>
         </a:p>
       </dgm:t>
     </dgm:pt>
@@ -890,29 +905,35 @@
         <a:bodyPr/>
         <a:lstStyle/>
         <a:p>
-          <a:endParaRPr lang="en-US"/>
+          <a:endParaRPr lang="en-US">
+            <a:effectLst/>
+          </a:endParaRPr>
         </a:p>
       </dgm:t>
     </dgm:pt>
-    <dgm:pt modelId="{9C924E15-985F-4B73-BE24-41329DDEDEC6}" type="sibTrans" cxnId="{BF824DE6-7E15-4433-BC43-8153227006DB}">
+    <dgm:pt modelId="{9C924E15-985F-4B73-BE24-41329DDEDEC6}" type="sibTrans" cxnId="{A1D32D32-0142-4DBC-A78F-E447219069DC}">
       <dgm:prSet/>
       <dgm:spPr/>
       <dgm:t>
         <a:bodyPr/>
         <a:lstStyle/>
         <a:p>
-          <a:endParaRPr lang="en-US"/>
+          <a:endParaRPr lang="en-US">
+            <a:effectLst/>
+          </a:endParaRPr>
         </a:p>
       </dgm:t>
     </dgm:pt>
-    <dgm:pt modelId="{1F952260-42AC-49D9-840E-A357B7316C32}" type="parTrans" cxnId="{F5ED4AC4-614C-4B1B-8F1A-817077C26228}">
+    <dgm:pt modelId="{1F952260-42AC-49D9-840E-A357B7316C32}" type="parTrans" cxnId="{AB333E04-5827-4AD6-B91B-53265AE3E361}">
       <dgm:prSet/>
       <dgm:spPr/>
       <dgm:t>
         <a:bodyPr/>
         <a:lstStyle/>
         <a:p>
-          <a:endParaRPr lang="en-US"/>
+          <a:endParaRPr lang="en-US">
+            <a:effectLst/>
+          </a:endParaRPr>
         </a:p>
       </dgm:t>
     </dgm:pt>
@@ -923,29 +944,35 @@
         <a:bodyPr/>
         <a:lstStyle/>
         <a:p>
-          <a:endParaRPr lang="en-US"/>
+          <a:endParaRPr lang="en-US">
+            <a:effectLst/>
+          </a:endParaRPr>
         </a:p>
       </dgm:t>
     </dgm:pt>
-    <dgm:pt modelId="{2DA82B40-F45D-4EF8-9B15-0E5E5794AC98}" type="sibTrans" cxnId="{F5ED4AC4-614C-4B1B-8F1A-817077C26228}">
+    <dgm:pt modelId="{2DA82B40-F45D-4EF8-9B15-0E5E5794AC98}" type="sibTrans" cxnId="{AB333E04-5827-4AD6-B91B-53265AE3E361}">
       <dgm:prSet/>
       <dgm:spPr/>
       <dgm:t>
         <a:bodyPr/>
         <a:lstStyle/>
         <a:p>
-          <a:endParaRPr lang="en-US"/>
+          <a:endParaRPr lang="en-US">
+            <a:effectLst/>
+          </a:endParaRPr>
         </a:p>
       </dgm:t>
     </dgm:pt>
-    <dgm:pt modelId="{3868496B-30F8-4CF5-864E-271C593682F9}" type="parTrans" cxnId="{F480FF75-3CC5-4F60-A63C-A63369565FF1}">
+    <dgm:pt modelId="{3868496B-30F8-4CF5-864E-271C593682F9}" type="parTrans" cxnId="{2C0D280F-531B-49D0-A201-C49B2FAE260D}">
       <dgm:prSet/>
       <dgm:spPr/>
       <dgm:t>
         <a:bodyPr/>
         <a:lstStyle/>
         <a:p>
-          <a:endParaRPr lang="en-US"/>
+          <a:endParaRPr lang="en-US">
+            <a:effectLst/>
+          </a:endParaRPr>
         </a:p>
       </dgm:t>
     </dgm:pt>
@@ -956,29 +983,35 @@
         <a:bodyPr/>
         <a:lstStyle/>
         <a:p>
-          <a:endParaRPr lang="en-US"/>
+          <a:endParaRPr lang="en-US">
+            <a:effectLst/>
+          </a:endParaRPr>
         </a:p>
       </dgm:t>
     </dgm:pt>
-    <dgm:pt modelId="{2A27DB49-7BAF-4A32-AFAA-E4A8B27C23E7}" type="sibTrans" cxnId="{F480FF75-3CC5-4F60-A63C-A63369565FF1}">
+    <dgm:pt modelId="{2A27DB49-7BAF-4A32-AFAA-E4A8B27C23E7}" type="sibTrans" cxnId="{2C0D280F-531B-49D0-A201-C49B2FAE260D}">
       <dgm:prSet/>
       <dgm:spPr/>
       <dgm:t>
         <a:bodyPr/>
         <a:lstStyle/>
         <a:p>
-          <a:endParaRPr lang="en-US"/>
+          <a:endParaRPr lang="en-US">
+            <a:effectLst/>
+          </a:endParaRPr>
         </a:p>
       </dgm:t>
     </dgm:pt>
-    <dgm:pt modelId="{801FB6EB-9D3B-4018-849C-E6F7EB73C647}" type="parTrans" cxnId="{741F59A3-244F-4D0D-B14B-9E9147C1BBC7}">
+    <dgm:pt modelId="{801FB6EB-9D3B-4018-849C-E6F7EB73C647}" type="parTrans" cxnId="{57151753-FF2A-45B0-BB0B-53958FDC4577}">
       <dgm:prSet/>
       <dgm:spPr/>
       <dgm:t>
         <a:bodyPr/>
         <a:lstStyle/>
         <a:p>
-          <a:endParaRPr lang="en-US"/>
+          <a:endParaRPr lang="en-US">
+            <a:effectLst/>
+          </a:endParaRPr>
         </a:p>
       </dgm:t>
     </dgm:pt>
@@ -989,29 +1022,35 @@
         <a:bodyPr/>
         <a:lstStyle/>
         <a:p>
-          <a:endParaRPr lang="en-US"/>
+          <a:endParaRPr lang="en-US">
+            <a:effectLst/>
+          </a:endParaRPr>
         </a:p>
       </dgm:t>
     </dgm:pt>
-    <dgm:pt modelId="{F745D90F-FA75-4156-9E2C-BF397E335841}" type="sibTrans" cxnId="{741F59A3-244F-4D0D-B14B-9E9147C1BBC7}">
+    <dgm:pt modelId="{F745D90F-FA75-4156-9E2C-BF397E335841}" type="sibTrans" cxnId="{57151753-FF2A-45B0-BB0B-53958FDC4577}">
       <dgm:prSet/>
       <dgm:spPr/>
       <dgm:t>
         <a:bodyPr/>
         <a:lstStyle/>
         <a:p>
-          <a:endParaRPr lang="en-US"/>
+          <a:endParaRPr lang="en-US">
+            <a:effectLst/>
+          </a:endParaRPr>
         </a:p>
       </dgm:t>
     </dgm:pt>
-    <dgm:pt modelId="{5A5377AB-368B-4C65-A41A-0D09B46EB2D2}" type="parTrans" cxnId="{B53A0F70-3420-4182-920D-311276A9113C}">
+    <dgm:pt modelId="{5A5377AB-368B-4C65-A41A-0D09B46EB2D2}" type="parTrans" cxnId="{8C9B0768-3FD0-490A-8149-9ACF90720BA6}">
       <dgm:prSet/>
       <dgm:spPr/>
       <dgm:t>
         <a:bodyPr/>
         <a:lstStyle/>
         <a:p>
-          <a:endParaRPr lang="en-US"/>
+          <a:endParaRPr lang="en-US">
+            <a:effectLst/>
+          </a:endParaRPr>
         </a:p>
       </dgm:t>
     </dgm:pt>
@@ -1022,18 +1061,22 @@
         <a:bodyPr/>
         <a:lstStyle/>
         <a:p>
-          <a:endParaRPr lang="en-US"/>
+          <a:endParaRPr lang="en-US">
+            <a:effectLst/>
+          </a:endParaRPr>
         </a:p>
       </dgm:t>
     </dgm:pt>
-    <dgm:pt modelId="{147B2DE2-3F50-42C1-B5DA-A648021D9BED}" type="sibTrans" cxnId="{B53A0F70-3420-4182-920D-311276A9113C}">
+    <dgm:pt modelId="{147B2DE2-3F50-42C1-B5DA-A648021D9BED}" type="sibTrans" cxnId="{8C9B0768-3FD0-490A-8149-9ACF90720BA6}">
       <dgm:prSet/>
       <dgm:spPr/>
       <dgm:t>
         <a:bodyPr/>
         <a:lstStyle/>
         <a:p>
-          <a:endParaRPr lang="en-US"/>
+          <a:endParaRPr lang="en-US">
+            <a:effectLst/>
+          </a:endParaRPr>
         </a:p>
       </dgm:t>
     </dgm:pt>
@@ -1154,31 +1197,31 @@
     </dgm:pt>
   </dgm:ptLst>
   <dgm:cxnLst>
-    <dgm:cxn modelId="{BF824DE6-7E15-4433-BC43-8153227006DB}" srcId="{71788355-5C90-4EF2-B8CB-20B3607734AA}" destId="{F3126B05-B37A-4D96-A264-97F053F506AB}" srcOrd="0" destOrd="0" parTransId="{5F45D818-FF2E-4103-B428-6BCDF4646EDC}" sibTransId="{9C924E15-985F-4B73-BE24-41329DDEDEC6}"/>
-    <dgm:cxn modelId="{F5ED4AC4-614C-4B1B-8F1A-817077C26228}" srcId="{71788355-5C90-4EF2-B8CB-20B3607734AA}" destId="{2836ACBB-6F73-46E9-B6A8-00EDA551E2C7}" srcOrd="1" destOrd="0" parTransId="{1F952260-42AC-49D9-840E-A357B7316C32}" sibTransId="{2DA82B40-F45D-4EF8-9B15-0E5E5794AC98}"/>
-    <dgm:cxn modelId="{F480FF75-3CC5-4F60-A63C-A63369565FF1}" srcId="{71788355-5C90-4EF2-B8CB-20B3607734AA}" destId="{A45B5A3F-BC60-4DC9-ADBC-E6EC3940CF2E}" srcOrd="2" destOrd="0" parTransId="{3868496B-30F8-4CF5-864E-271C593682F9}" sibTransId="{2A27DB49-7BAF-4A32-AFAA-E4A8B27C23E7}"/>
-    <dgm:cxn modelId="{741F59A3-244F-4D0D-B14B-9E9147C1BBC7}" srcId="{71788355-5C90-4EF2-B8CB-20B3607734AA}" destId="{4147591B-333F-44D3-B914-CC481B3F8D70}" srcOrd="3" destOrd="0" parTransId="{801FB6EB-9D3B-4018-849C-E6F7EB73C647}" sibTransId="{F745D90F-FA75-4156-9E2C-BF397E335841}"/>
-    <dgm:cxn modelId="{B53A0F70-3420-4182-920D-311276A9113C}" srcId="{71788355-5C90-4EF2-B8CB-20B3607734AA}" destId="{53BC487E-9799-4CFB-9730-8BE7B982A666}" srcOrd="4" destOrd="0" parTransId="{5A5377AB-368B-4C65-A41A-0D09B46EB2D2}" sibTransId="{147B2DE2-3F50-42C1-B5DA-A648021D9BED}"/>
-    <dgm:cxn modelId="{473945DC-3D71-485A-8752-DCCD07074BCF}" type="presOf" srcId="{71788355-5C90-4EF2-B8CB-20B3607734AA}" destId="{A2480343-D114-4088-B0EA-D7225FA038B7}" srcOrd="0" destOrd="0" presId="urn:microsoft.com/office/officeart/2005/8/layout/default"/>
-    <dgm:cxn modelId="{DF813D2C-179F-448F-80C1-593CB3B0AB37}" type="presParOf" srcId="{A2480343-D114-4088-B0EA-D7225FA038B7}" destId="{3886CA23-09D4-459C-813A-6B8DA4B820D0}" srcOrd="0" destOrd="0" presId="urn:microsoft.com/office/officeart/2005/8/layout/default"/>
-    <dgm:cxn modelId="{19F92339-10C8-4294-9A24-11C32E39BAC6}" type="presOf" srcId="{F3126B05-B37A-4D96-A264-97F053F506AB}" destId="{3886CA23-09D4-459C-813A-6B8DA4B820D0}" srcOrd="0" destOrd="0" presId="urn:microsoft.com/office/officeart/2005/8/layout/default"/>
-    <dgm:cxn modelId="{FD6B5E3C-DE66-4F80-89C9-A36AE3B5B8DA}" type="presParOf" srcId="{A2480343-D114-4088-B0EA-D7225FA038B7}" destId="{3E499DBE-A449-4766-95EC-32B81EED08CC}" srcOrd="1" destOrd="0" presId="urn:microsoft.com/office/officeart/2005/8/layout/default"/>
-    <dgm:cxn modelId="{BA927B25-EA70-482D-8833-8122FFC5B2D3}" type="presParOf" srcId="{A2480343-D114-4088-B0EA-D7225FA038B7}" destId="{BE93A411-DE81-4766-91A5-81368CB85AE3}" srcOrd="2" destOrd="0" presId="urn:microsoft.com/office/officeart/2005/8/layout/default"/>
-    <dgm:cxn modelId="{57DC21C8-1539-424B-BCE2-3BD1DE0EF8F9}" type="presOf" srcId="{2836ACBB-6F73-46E9-B6A8-00EDA551E2C7}" destId="{BE93A411-DE81-4766-91A5-81368CB85AE3}" srcOrd="0" destOrd="0" presId="urn:microsoft.com/office/officeart/2005/8/layout/default"/>
-    <dgm:cxn modelId="{DF0FB7CB-12D1-4612-BEEA-4032CCA00001}" type="presParOf" srcId="{A2480343-D114-4088-B0EA-D7225FA038B7}" destId="{5AC46D07-1E3D-40D2-A23E-ED73599D5157}" srcOrd="3" destOrd="0" presId="urn:microsoft.com/office/officeart/2005/8/layout/default"/>
-    <dgm:cxn modelId="{67BFF933-87BD-4728-AC21-CF0AD4581DC5}" type="presParOf" srcId="{A2480343-D114-4088-B0EA-D7225FA038B7}" destId="{D02DBA44-DFBE-460D-8EC2-15044911DD5F}" srcOrd="4" destOrd="0" presId="urn:microsoft.com/office/officeart/2005/8/layout/default"/>
-    <dgm:cxn modelId="{A5A49D19-C16D-4C28-88D8-3E67A50316FE}" type="presOf" srcId="{A45B5A3F-BC60-4DC9-ADBC-E6EC3940CF2E}" destId="{D02DBA44-DFBE-460D-8EC2-15044911DD5F}" srcOrd="0" destOrd="0" presId="urn:microsoft.com/office/officeart/2005/8/layout/default"/>
-    <dgm:cxn modelId="{362EA1FF-867A-43F3-8781-B319268D4A21}" type="presParOf" srcId="{A2480343-D114-4088-B0EA-D7225FA038B7}" destId="{F62096A2-28F7-4459-8B2E-7DF1413EBB7C}" srcOrd="5" destOrd="0" presId="urn:microsoft.com/office/officeart/2005/8/layout/default"/>
-    <dgm:cxn modelId="{2A76BC5E-3BE9-47F1-9258-235619A12B8D}" type="presParOf" srcId="{A2480343-D114-4088-B0EA-D7225FA038B7}" destId="{5430CB7B-C3B5-45ED-9E02-051EB70FD26A}" srcOrd="6" destOrd="0" presId="urn:microsoft.com/office/officeart/2005/8/layout/default"/>
-    <dgm:cxn modelId="{8B82ED22-8069-4AD7-804F-EAA24BBAD596}" type="presOf" srcId="{4147591B-333F-44D3-B914-CC481B3F8D70}" destId="{5430CB7B-C3B5-45ED-9E02-051EB70FD26A}" srcOrd="0" destOrd="0" presId="urn:microsoft.com/office/officeart/2005/8/layout/default"/>
-    <dgm:cxn modelId="{26CBF073-4D74-473C-9947-F4F533121F09}" type="presParOf" srcId="{A2480343-D114-4088-B0EA-D7225FA038B7}" destId="{32F5AE09-5B1A-49AC-9480-E452BDBA6AD4}" srcOrd="7" destOrd="0" presId="urn:microsoft.com/office/officeart/2005/8/layout/default"/>
-    <dgm:cxn modelId="{F508C613-7416-4AE6-BF4A-0E93FAC433DD}" type="presParOf" srcId="{A2480343-D114-4088-B0EA-D7225FA038B7}" destId="{BDCB7BFB-E2A3-4CCD-AB09-5CA5E01A6A3F}" srcOrd="8" destOrd="0" presId="urn:microsoft.com/office/officeart/2005/8/layout/default"/>
-    <dgm:cxn modelId="{A6A332F9-5AC4-4FEB-AD69-F5ADE903A98B}" type="presOf" srcId="{53BC487E-9799-4CFB-9730-8BE7B982A666}" destId="{BDCB7BFB-E2A3-4CCD-AB09-5CA5E01A6A3F}" srcOrd="0" destOrd="0" presId="urn:microsoft.com/office/officeart/2005/8/layout/default"/>
+    <dgm:cxn modelId="{A1D32D32-0142-4DBC-A78F-E447219069DC}" srcId="{71788355-5C90-4EF2-B8CB-20B3607734AA}" destId="{F3126B05-B37A-4D96-A264-97F053F506AB}" srcOrd="0" destOrd="0" parTransId="{5F45D818-FF2E-4103-B428-6BCDF4646EDC}" sibTransId="{9C924E15-985F-4B73-BE24-41329DDEDEC6}"/>
+    <dgm:cxn modelId="{AB333E04-5827-4AD6-B91B-53265AE3E361}" srcId="{71788355-5C90-4EF2-B8CB-20B3607734AA}" destId="{2836ACBB-6F73-46E9-B6A8-00EDA551E2C7}" srcOrd="1" destOrd="0" parTransId="{1F952260-42AC-49D9-840E-A357B7316C32}" sibTransId="{2DA82B40-F45D-4EF8-9B15-0E5E5794AC98}"/>
+    <dgm:cxn modelId="{2C0D280F-531B-49D0-A201-C49B2FAE260D}" srcId="{71788355-5C90-4EF2-B8CB-20B3607734AA}" destId="{A45B5A3F-BC60-4DC9-ADBC-E6EC3940CF2E}" srcOrd="2" destOrd="0" parTransId="{3868496B-30F8-4CF5-864E-271C593682F9}" sibTransId="{2A27DB49-7BAF-4A32-AFAA-E4A8B27C23E7}"/>
+    <dgm:cxn modelId="{57151753-FF2A-45B0-BB0B-53958FDC4577}" srcId="{71788355-5C90-4EF2-B8CB-20B3607734AA}" destId="{4147591B-333F-44D3-B914-CC481B3F8D70}" srcOrd="3" destOrd="0" parTransId="{801FB6EB-9D3B-4018-849C-E6F7EB73C647}" sibTransId="{F745D90F-FA75-4156-9E2C-BF397E335841}"/>
+    <dgm:cxn modelId="{8C9B0768-3FD0-490A-8149-9ACF90720BA6}" srcId="{71788355-5C90-4EF2-B8CB-20B3607734AA}" destId="{53BC487E-9799-4CFB-9730-8BE7B982A666}" srcOrd="4" destOrd="0" parTransId="{5A5377AB-368B-4C65-A41A-0D09B46EB2D2}" sibTransId="{147B2DE2-3F50-42C1-B5DA-A648021D9BED}"/>
+    <dgm:cxn modelId="{A0AE3A2A-6D4D-41B9-92CA-D85F3760A322}" type="presOf" srcId="{71788355-5C90-4EF2-B8CB-20B3607734AA}" destId="{A2480343-D114-4088-B0EA-D7225FA038B7}" srcOrd="0" destOrd="0" presId="urn:microsoft.com/office/officeart/2005/8/layout/default"/>
+    <dgm:cxn modelId="{417AC325-00E4-4F4C-84B6-AB962D186434}" type="presParOf" srcId="{A2480343-D114-4088-B0EA-D7225FA038B7}" destId="{3886CA23-09D4-459C-813A-6B8DA4B820D0}" srcOrd="0" destOrd="0" presId="urn:microsoft.com/office/officeart/2005/8/layout/default"/>
+    <dgm:cxn modelId="{F51AC4AC-3BE6-41C4-949A-0A617D900445}" type="presOf" srcId="{F3126B05-B37A-4D96-A264-97F053F506AB}" destId="{3886CA23-09D4-459C-813A-6B8DA4B820D0}" srcOrd="0" destOrd="0" presId="urn:microsoft.com/office/officeart/2005/8/layout/default"/>
+    <dgm:cxn modelId="{DBA37CE8-B88E-4CD3-9C10-8FF5983D288A}" type="presParOf" srcId="{A2480343-D114-4088-B0EA-D7225FA038B7}" destId="{3E499DBE-A449-4766-95EC-32B81EED08CC}" srcOrd="1" destOrd="0" presId="urn:microsoft.com/office/officeart/2005/8/layout/default"/>
+    <dgm:cxn modelId="{372EB227-9456-4BE6-B9EC-4A9EDD86D55F}" type="presParOf" srcId="{A2480343-D114-4088-B0EA-D7225FA038B7}" destId="{BE93A411-DE81-4766-91A5-81368CB85AE3}" srcOrd="2" destOrd="0" presId="urn:microsoft.com/office/officeart/2005/8/layout/default"/>
+    <dgm:cxn modelId="{B6BEFA67-08A0-4605-A462-FC109C3697D9}" type="presOf" srcId="{2836ACBB-6F73-46E9-B6A8-00EDA551E2C7}" destId="{BE93A411-DE81-4766-91A5-81368CB85AE3}" srcOrd="0" destOrd="0" presId="urn:microsoft.com/office/officeart/2005/8/layout/default"/>
+    <dgm:cxn modelId="{49CC9716-B105-413D-BFB9-4CC76DF8E0A1}" type="presParOf" srcId="{A2480343-D114-4088-B0EA-D7225FA038B7}" destId="{5AC46D07-1E3D-40D2-A23E-ED73599D5157}" srcOrd="3" destOrd="0" presId="urn:microsoft.com/office/officeart/2005/8/layout/default"/>
+    <dgm:cxn modelId="{1256CC10-DB40-4542-94D6-EA75DFA0ED0C}" type="presParOf" srcId="{A2480343-D114-4088-B0EA-D7225FA038B7}" destId="{D02DBA44-DFBE-460D-8EC2-15044911DD5F}" srcOrd="4" destOrd="0" presId="urn:microsoft.com/office/officeart/2005/8/layout/default"/>
+    <dgm:cxn modelId="{B20B06CD-B41A-4184-84A2-12B998B4BC6B}" type="presOf" srcId="{A45B5A3F-BC60-4DC9-ADBC-E6EC3940CF2E}" destId="{D02DBA44-DFBE-460D-8EC2-15044911DD5F}" srcOrd="0" destOrd="0" presId="urn:microsoft.com/office/officeart/2005/8/layout/default"/>
+    <dgm:cxn modelId="{52F6F2AE-5A21-43DB-A084-57BDBF26450D}" type="presParOf" srcId="{A2480343-D114-4088-B0EA-D7225FA038B7}" destId="{F62096A2-28F7-4459-8B2E-7DF1413EBB7C}" srcOrd="5" destOrd="0" presId="urn:microsoft.com/office/officeart/2005/8/layout/default"/>
+    <dgm:cxn modelId="{0739B3AC-0BF6-4F9F-98F7-12E700703EF8}" type="presParOf" srcId="{A2480343-D114-4088-B0EA-D7225FA038B7}" destId="{5430CB7B-C3B5-45ED-9E02-051EB70FD26A}" srcOrd="6" destOrd="0" presId="urn:microsoft.com/office/officeart/2005/8/layout/default"/>
+    <dgm:cxn modelId="{156F5CB2-CE97-4D51-8376-EBCB3F9C5DCB}" type="presOf" srcId="{4147591B-333F-44D3-B914-CC481B3F8D70}" destId="{5430CB7B-C3B5-45ED-9E02-051EB70FD26A}" srcOrd="0" destOrd="0" presId="urn:microsoft.com/office/officeart/2005/8/layout/default"/>
+    <dgm:cxn modelId="{8B41046C-2CA4-4E78-A538-CD91F79B6DAA}" type="presParOf" srcId="{A2480343-D114-4088-B0EA-D7225FA038B7}" destId="{32F5AE09-5B1A-49AC-9480-E452BDBA6AD4}" srcOrd="7" destOrd="0" presId="urn:microsoft.com/office/officeart/2005/8/layout/default"/>
+    <dgm:cxn modelId="{C48BAC6D-21E0-448E-8CFC-3F7229609FA2}" type="presParOf" srcId="{A2480343-D114-4088-B0EA-D7225FA038B7}" destId="{BDCB7BFB-E2A3-4CCD-AB09-5CA5E01A6A3F}" srcOrd="8" destOrd="0" presId="urn:microsoft.com/office/officeart/2005/8/layout/default"/>
+    <dgm:cxn modelId="{90DA4E4D-2344-4F57-955E-E6D745DB6558}" type="presOf" srcId="{53BC487E-9799-4CFB-9730-8BE7B982A666}" destId="{BDCB7BFB-E2A3-4CCD-AB09-5CA5E01A6A3F}" srcOrd="0" destOrd="0" presId="urn:microsoft.com/office/officeart/2005/8/layout/default"/>
   </dgm:cxnLst>
-  <dgm:bg/>
-  <dgm:whole>
-    <a:ln/>
-  </dgm:whole>
+  <dgm:bg>
+    <a:effectLst/>
+  </dgm:bg>
+  <dgm:whole/>
 </dgm:dataModel>
 </file>
 
@@ -2673,6 +2716,7 @@
           <a:off x="0" y="0"/>
           <a:ext cx="0" cy="0"/>
         </a:xfrm>
+        <a:effectLst/>
       </p:grpSpPr>
       <p:sp>
         <p:nvSpPr>
@@ -2689,16 +2733,21 @@
             <a:off x="685800" y="2130425"/>
             <a:ext cx="7772400" cy="1470025"/>
           </a:xfrm>
+          <a:effectLst/>
         </p:spPr>
         <p:txBody>
           <a:bodyPr/>
           <a:lstStyle/>
           <a:p>
             <a:r>
-              <a:rPr lang="en-US" smtClean="0"/>
+              <a:rPr lang="en-US" smtClean="0">
+                <a:effectLst/>
+              </a:rPr>
               <a:t>Click to edit Master title style</a:t>
             </a:r>
-            <a:endParaRPr lang="en-US"/>
+            <a:endParaRPr lang="en-US">
+              <a:effectLst/>
+            </a:endParaRPr>
           </a:p>
         </p:txBody>
       </p:sp>
@@ -2717,6 +2766,7 @@
             <a:off x="1371600" y="3886200"/>
             <a:ext cx="6400800" cy="1752600"/>
           </a:xfrm>
+          <a:effectLst/>
         </p:spPr>
         <p:txBody>
           <a:bodyPr/>
@@ -2729,6 +2779,7 @@
                     <a:tint val="75000"/>
                   </a:schemeClr>
                 </a:solidFill>
+                <a:effectLst/>
               </a:defRPr>
             </a:lvl1pPr>
             <a:lvl2pPr marL="457200" indent="0" algn="ctr">
@@ -2739,6 +2790,7 @@
                     <a:tint val="75000"/>
                   </a:schemeClr>
                 </a:solidFill>
+                <a:effectLst/>
               </a:defRPr>
             </a:lvl2pPr>
             <a:lvl3pPr marL="914400" indent="0" algn="ctr">
@@ -2749,6 +2801,7 @@
                     <a:tint val="75000"/>
                   </a:schemeClr>
                 </a:solidFill>
+                <a:effectLst/>
               </a:defRPr>
             </a:lvl3pPr>
             <a:lvl4pPr marL="1371600" indent="0" algn="ctr">
@@ -2759,6 +2812,7 @@
                     <a:tint val="75000"/>
                   </a:schemeClr>
                 </a:solidFill>
+                <a:effectLst/>
               </a:defRPr>
             </a:lvl4pPr>
             <a:lvl5pPr marL="1828800" indent="0" algn="ctr">
@@ -2769,6 +2823,7 @@
                     <a:tint val="75000"/>
                   </a:schemeClr>
                 </a:solidFill>
+                <a:effectLst/>
               </a:defRPr>
             </a:lvl5pPr>
             <a:lvl6pPr marL="2286000" indent="0" algn="ctr">
@@ -2779,6 +2834,7 @@
                     <a:tint val="75000"/>
                   </a:schemeClr>
                 </a:solidFill>
+                <a:effectLst/>
               </a:defRPr>
             </a:lvl6pPr>
             <a:lvl7pPr marL="2743200" indent="0" algn="ctr">
@@ -2789,6 +2845,7 @@
                     <a:tint val="75000"/>
                   </a:schemeClr>
                 </a:solidFill>
+                <a:effectLst/>
               </a:defRPr>
             </a:lvl7pPr>
             <a:lvl8pPr marL="3200400" indent="0" algn="ctr">
@@ -2799,6 +2856,7 @@
                     <a:tint val="75000"/>
                   </a:schemeClr>
                 </a:solidFill>
+                <a:effectLst/>
               </a:defRPr>
             </a:lvl8pPr>
             <a:lvl9pPr marL="3657600" indent="0" algn="ctr">
@@ -2809,15 +2867,20 @@
                     <a:tint val="75000"/>
                   </a:schemeClr>
                 </a:solidFill>
+                <a:effectLst/>
               </a:defRPr>
             </a:lvl9pPr>
           </a:lstStyle>
           <a:p>
             <a:r>
-              <a:rPr lang="en-US" smtClean="0"/>
+              <a:rPr lang="en-US" smtClean="0">
+                <a:effectLst/>
+              </a:rPr>
               <a:t>Click to edit Master subtitle style</a:t>
             </a:r>
-            <a:endParaRPr lang="en-US"/>
+            <a:endParaRPr lang="en-US">
+              <a:effectLst/>
+            </a:endParaRPr>
           </a:p>
         </p:txBody>
       </p:sp>
@@ -2831,16 +2894,22 @@
             <p:ph type="dt" sz="half" idx="10"/>
           </p:nvPr>
         </p:nvSpPr>
-        <p:spPr/>
+        <p:spPr>
+          <a:effectLst/>
+        </p:spPr>
         <p:txBody>
           <a:bodyPr/>
           <a:lstStyle/>
           <a:p>
             <a:fld id="{E8FD0B7A-F5DD-4F40-B4CB-3B2C354B893A}" type="datetimeFigureOut">
-              <a:rPr lang="en-US" smtClean="0"/>
+              <a:rPr lang="en-US" smtClean="0">
+                <a:effectLst/>
+              </a:rPr>
               <a:t>Date</a:t>
             </a:fld>
-            <a:endParaRPr lang="en-US"/>
+            <a:endParaRPr lang="en-US">
+              <a:effectLst/>
+            </a:endParaRPr>
           </a:p>
         </p:txBody>
       </p:sp>
@@ -2854,12 +2923,16 @@
             <p:ph type="ftr" sz="quarter" idx="11"/>
           </p:nvPr>
         </p:nvSpPr>
-        <p:spPr/>
+        <p:spPr>
+          <a:effectLst/>
+        </p:spPr>
         <p:txBody>
           <a:bodyPr/>
           <a:lstStyle/>
           <a:p>
-            <a:endParaRPr lang="en-US"/>
+            <a:endParaRPr lang="en-US">
+              <a:effectLst/>
+            </a:endParaRPr>
           </a:p>
         </p:txBody>
       </p:sp>
@@ -2873,16 +2946,22 @@
             <p:ph type="sldNum" sz="quarter" idx="12"/>
           </p:nvPr>
         </p:nvSpPr>
-        <p:spPr/>
+        <p:spPr>
+          <a:effectLst/>
+        </p:spPr>
         <p:txBody>
           <a:bodyPr/>
           <a:lstStyle/>
           <a:p>
             <a:fld id="{93AE1883-0942-4AA3-9DB2-9C7C3A0314B1}" type="slidenum">
-              <a:rPr lang="en-US" smtClean="0"/>
+              <a:rPr lang="en-US" smtClean="0">
+                <a:effectLst/>
+              </a:rPr>
               <a:t>‹#›</a:t>
             </a:fld>
-            <a:endParaRPr lang="en-US"/>
+            <a:endParaRPr lang="en-US">
+              <a:effectLst/>
+            </a:endParaRPr>
           </a:p>
         </p:txBody>
       </p:sp>
@@ -2910,6 +2989,7 @@
           <a:off x="0" y="0"/>
           <a:ext cx="0" cy="0"/>
         </a:xfrm>
+        <a:effectLst/>
       </p:grpSpPr>
       <p:sp>
         <p:nvSpPr>
@@ -2921,16 +3001,22 @@
             <p:ph type="title"/>
           </p:nvPr>
         </p:nvSpPr>
-        <p:spPr/>
+        <p:spPr>
+          <a:effectLst/>
+        </p:spPr>
         <p:txBody>
           <a:bodyPr/>
           <a:lstStyle/>
           <a:p>
             <a:r>
-              <a:rPr lang="en-US" smtClean="0"/>
+              <a:rPr lang="en-US" smtClean="0">
+                <a:effectLst/>
+              </a:rPr>
               <a:t>Click to edit Master title style</a:t>
             </a:r>
-            <a:endParaRPr lang="en-US"/>
+            <a:endParaRPr lang="en-US">
+              <a:effectLst/>
+            </a:endParaRPr>
           </a:p>
         </p:txBody>
       </p:sp>
@@ -2944,45 +3030,59 @@
             <p:ph type="body" orient="vert" idx="1"/>
           </p:nvPr>
         </p:nvSpPr>
-        <p:spPr/>
+        <p:spPr>
+          <a:effectLst/>
+        </p:spPr>
         <p:txBody>
           <a:bodyPr vert="eaVert"/>
           <a:lstStyle/>
           <a:p>
             <a:pPr lvl="0"/>
             <a:r>
-              <a:rPr lang="en-US" smtClean="0"/>
+              <a:rPr lang="en-US" smtClean="0">
+                <a:effectLst/>
+              </a:rPr>
               <a:t>Click to edit Master text styles</a:t>
             </a:r>
           </a:p>
           <a:p>
             <a:pPr lvl="1"/>
             <a:r>
-              <a:rPr lang="en-US" smtClean="0"/>
+              <a:rPr lang="en-US" smtClean="0">
+                <a:effectLst/>
+              </a:rPr>
               <a:t>Second level</a:t>
             </a:r>
           </a:p>
           <a:p>
             <a:pPr lvl="2"/>
             <a:r>
-              <a:rPr lang="en-US" smtClean="0"/>
+              <a:rPr lang="en-US" smtClean="0">
+                <a:effectLst/>
+              </a:rPr>
               <a:t>Third level</a:t>
             </a:r>
           </a:p>
           <a:p>
             <a:pPr lvl="3"/>
             <a:r>
-              <a:rPr lang="en-US" smtClean="0"/>
+              <a:rPr lang="en-US" smtClean="0">
+                <a:effectLst/>
+              </a:rPr>
               <a:t>Fourth level</a:t>
             </a:r>
           </a:p>
           <a:p>
             <a:pPr lvl="4"/>
             <a:r>
-              <a:rPr lang="en-US" smtClean="0"/>
+              <a:rPr lang="en-US" smtClean="0">
+                <a:effectLst/>
+              </a:rPr>
               <a:t>Fifth level</a:t>
             </a:r>
-            <a:endParaRPr lang="en-US"/>
+            <a:endParaRPr lang="en-US">
+              <a:effectLst/>
+            </a:endParaRPr>
           </a:p>
         </p:txBody>
       </p:sp>
@@ -2996,16 +3096,22 @@
             <p:ph type="dt" sz="half" idx="10"/>
           </p:nvPr>
         </p:nvSpPr>
-        <p:spPr/>
+        <p:spPr>
+          <a:effectLst/>
+        </p:spPr>
         <p:txBody>
           <a:bodyPr/>
           <a:lstStyle/>
           <a:p>
             <a:fld id="{E8FD0B7A-F5DD-4F40-B4CB-3B2C354B893A}" type="datetimeFigureOut">
-              <a:rPr lang="en-US" smtClean="0"/>
+              <a:rPr lang="en-US" smtClean="0">
+                <a:effectLst/>
+              </a:rPr>
               <a:t>Date</a:t>
             </a:fld>
-            <a:endParaRPr lang="en-US"/>
+            <a:endParaRPr lang="en-US">
+              <a:effectLst/>
+            </a:endParaRPr>
           </a:p>
         </p:txBody>
       </p:sp>
@@ -3019,12 +3125,16 @@
             <p:ph type="ftr" sz="quarter" idx="11"/>
           </p:nvPr>
         </p:nvSpPr>
-        <p:spPr/>
+        <p:spPr>
+          <a:effectLst/>
+        </p:spPr>
         <p:txBody>
           <a:bodyPr/>
           <a:lstStyle/>
           <a:p>
-            <a:endParaRPr lang="en-US"/>
+            <a:endParaRPr lang="en-US">
+              <a:effectLst/>
+            </a:endParaRPr>
           </a:p>
         </p:txBody>
       </p:sp>
@@ -3038,16 +3148,22 @@
             <p:ph type="sldNum" sz="quarter" idx="12"/>
           </p:nvPr>
         </p:nvSpPr>
-        <p:spPr/>
+        <p:spPr>
+          <a:effectLst/>
+        </p:spPr>
         <p:txBody>
           <a:bodyPr/>
           <a:lstStyle/>
           <a:p>
             <a:fld id="{93AE1883-0942-4AA3-9DB2-9C7C3A0314B1}" type="slidenum">
-              <a:rPr lang="en-US" smtClean="0"/>
+              <a:rPr lang="en-US" smtClean="0">
+                <a:effectLst/>
+              </a:rPr>
               <a:t>‹#›</a:t>
             </a:fld>
-            <a:endParaRPr lang="en-US"/>
+            <a:endParaRPr lang="en-US">
+              <a:effectLst/>
+            </a:endParaRPr>
           </a:p>
         </p:txBody>
       </p:sp>
@@ -3075,6 +3191,7 @@
           <a:off x="0" y="0"/>
           <a:ext cx="0" cy="0"/>
         </a:xfrm>
+        <a:effectLst/>
       </p:grpSpPr>
       <p:sp>
         <p:nvSpPr>
@@ -3091,16 +3208,21 @@
             <a:off x="6629400" y="274638"/>
             <a:ext cx="2057400" cy="5851525"/>
           </a:xfrm>
+          <a:effectLst/>
         </p:spPr>
         <p:txBody>
           <a:bodyPr vert="eaVert"/>
           <a:lstStyle/>
           <a:p>
             <a:r>
-              <a:rPr lang="en-US" smtClean="0"/>
+              <a:rPr lang="en-US" smtClean="0">
+                <a:effectLst/>
+              </a:rPr>
               <a:t>Click to edit Master title style</a:t>
             </a:r>
-            <a:endParaRPr lang="en-US"/>
+            <a:endParaRPr lang="en-US">
+              <a:effectLst/>
+            </a:endParaRPr>
           </a:p>
         </p:txBody>
       </p:sp>
@@ -3119,6 +3241,7 @@
             <a:off x="457200" y="274638"/>
             <a:ext cx="6019800" cy="5851525"/>
           </a:xfrm>
+          <a:effectLst/>
         </p:spPr>
         <p:txBody>
           <a:bodyPr vert="eaVert"/>
@@ -3126,38 +3249,50 @@
           <a:p>
             <a:pPr lvl="0"/>
             <a:r>
-              <a:rPr lang="en-US" smtClean="0"/>
+              <a:rPr lang="en-US" smtClean="0">
+                <a:effectLst/>
+              </a:rPr>
               <a:t>Click to edit Master text styles</a:t>
             </a:r>
           </a:p>
           <a:p>
             <a:pPr lvl="1"/>
             <a:r>
-              <a:rPr lang="en-US" smtClean="0"/>
+              <a:rPr lang="en-US" smtClean="0">
+                <a:effectLst/>
+              </a:rPr>
               <a:t>Second level</a:t>
             </a:r>
           </a:p>
           <a:p>
             <a:pPr lvl="2"/>
             <a:r>
-              <a:rPr lang="en-US" smtClean="0"/>
+              <a:rPr lang="en-US" smtClean="0">
+                <a:effectLst/>
+              </a:rPr>
               <a:t>Third level</a:t>
             </a:r>
           </a:p>
           <a:p>
             <a:pPr lvl="3"/>
             <a:r>
-              <a:rPr lang="en-US" smtClean="0"/>
+              <a:rPr lang="en-US" smtClean="0">
+                <a:effectLst/>
+              </a:rPr>
               <a:t>Fourth level</a:t>
             </a:r>
           </a:p>
           <a:p>
             <a:pPr lvl="4"/>
             <a:r>
-              <a:rPr lang="en-US" smtClean="0"/>
+              <a:rPr lang="en-US" smtClean="0">
+                <a:effectLst/>
+              </a:rPr>
               <a:t>Fifth level</a:t>
             </a:r>
-            <a:endParaRPr lang="en-US"/>
+            <a:endParaRPr lang="en-US">
+              <a:effectLst/>
+            </a:endParaRPr>
           </a:p>
         </p:txBody>
       </p:sp>
@@ -3171,16 +3306,22 @@
             <p:ph type="dt" sz="half" idx="10"/>
           </p:nvPr>
         </p:nvSpPr>
-        <p:spPr/>
+        <p:spPr>
+          <a:effectLst/>
+        </p:spPr>
         <p:txBody>
           <a:bodyPr/>
           <a:lstStyle/>
           <a:p>
             <a:fld id="{E8FD0B7A-F5DD-4F40-B4CB-3B2C354B893A}" type="datetimeFigureOut">
-              <a:rPr lang="en-US" smtClean="0"/>
+              <a:rPr lang="en-US" smtClean="0">
+                <a:effectLst/>
+              </a:rPr>
               <a:t>Date</a:t>
             </a:fld>
-            <a:endParaRPr lang="en-US"/>
+            <a:endParaRPr lang="en-US">
+              <a:effectLst/>
+            </a:endParaRPr>
           </a:p>
         </p:txBody>
       </p:sp>
@@ -3194,12 +3335,16 @@
             <p:ph type="ftr" sz="quarter" idx="11"/>
           </p:nvPr>
         </p:nvSpPr>
-        <p:spPr/>
+        <p:spPr>
+          <a:effectLst/>
+        </p:spPr>
         <p:txBody>
           <a:bodyPr/>
           <a:lstStyle/>
           <a:p>
-            <a:endParaRPr lang="en-US"/>
+            <a:endParaRPr lang="en-US">
+              <a:effectLst/>
+            </a:endParaRPr>
           </a:p>
         </p:txBody>
       </p:sp>
@@ -3213,16 +3358,22 @@
             <p:ph type="sldNum" sz="quarter" idx="12"/>
           </p:nvPr>
         </p:nvSpPr>
-        <p:spPr/>
+        <p:spPr>
+          <a:effectLst/>
+        </p:spPr>
         <p:txBody>
           <a:bodyPr/>
           <a:lstStyle/>
           <a:p>
             <a:fld id="{93AE1883-0942-4AA3-9DB2-9C7C3A0314B1}" type="slidenum">
-              <a:rPr lang="en-US" smtClean="0"/>
+              <a:rPr lang="en-US" smtClean="0">
+                <a:effectLst/>
+              </a:rPr>
               <a:t>‹#›</a:t>
             </a:fld>
-            <a:endParaRPr lang="en-US"/>
+            <a:endParaRPr lang="en-US">
+              <a:effectLst/>
+            </a:endParaRPr>
           </a:p>
         </p:txBody>
       </p:sp>
@@ -3250,6 +3401,7 @@
           <a:off x="0" y="0"/>
           <a:ext cx="0" cy="0"/>
         </a:xfrm>
+        <a:effectLst/>
       </p:grpSpPr>
       <p:sp>
         <p:nvSpPr>
@@ -3261,16 +3413,22 @@
             <p:ph type="title"/>
           </p:nvPr>
         </p:nvSpPr>
-        <p:spPr/>
+        <p:spPr>
+          <a:effectLst/>
+        </p:spPr>
         <p:txBody>
           <a:bodyPr/>
           <a:lstStyle/>
           <a:p>
             <a:r>
-              <a:rPr lang="en-US" smtClean="0"/>
+              <a:rPr lang="en-US" smtClean="0">
+                <a:effectLst/>
+              </a:rPr>
               <a:t>Click to edit Master title style</a:t>
             </a:r>
-            <a:endParaRPr lang="en-US"/>
+            <a:endParaRPr lang="en-US">
+              <a:effectLst/>
+            </a:endParaRPr>
           </a:p>
         </p:txBody>
       </p:sp>
@@ -3284,45 +3442,59 @@
             <p:ph idx="1"/>
           </p:nvPr>
         </p:nvSpPr>
-        <p:spPr/>
+        <p:spPr>
+          <a:effectLst/>
+        </p:spPr>
         <p:txBody>
           <a:bodyPr/>
           <a:lstStyle/>
           <a:p>
             <a:pPr lvl="0"/>
             <a:r>
-              <a:rPr lang="en-US" smtClean="0"/>
+              <a:rPr lang="en-US" smtClean="0">
+                <a:effectLst/>
+              </a:rPr>
               <a:t>Click to edit Master text styles</a:t>
             </a:r>
           </a:p>
           <a:p>
             <a:pPr lvl="1"/>
             <a:r>
-              <a:rPr lang="en-US" smtClean="0"/>
+              <a:rPr lang="en-US" smtClean="0">
+                <a:effectLst/>
+              </a:rPr>
               <a:t>Second level</a:t>
             </a:r>
           </a:p>
           <a:p>
             <a:pPr lvl="2"/>
             <a:r>
-              <a:rPr lang="en-US" smtClean="0"/>
+              <a:rPr lang="en-US" smtClean="0">
+                <a:effectLst/>
+              </a:rPr>
               <a:t>Third level</a:t>
             </a:r>
           </a:p>
           <a:p>
             <a:pPr lvl="3"/>
             <a:r>
-              <a:rPr lang="en-US" smtClean="0"/>
+              <a:rPr lang="en-US" smtClean="0">
+                <a:effectLst/>
+              </a:rPr>
               <a:t>Fourth level</a:t>
             </a:r>
           </a:p>
           <a:p>
             <a:pPr lvl="4"/>
             <a:r>
-              <a:rPr lang="en-US" smtClean="0"/>
+              <a:rPr lang="en-US" smtClean="0">
+                <a:effectLst/>
+              </a:rPr>
               <a:t>Fifth level</a:t>
             </a:r>
-            <a:endParaRPr lang="en-US"/>
+            <a:endParaRPr lang="en-US">
+              <a:effectLst/>
+            </a:endParaRPr>
           </a:p>
         </p:txBody>
       </p:sp>
@@ -3336,16 +3508,22 @@
             <p:ph type="dt" sz="half" idx="10"/>
           </p:nvPr>
         </p:nvSpPr>
-        <p:spPr/>
+        <p:spPr>
+          <a:effectLst/>
+        </p:spPr>
         <p:txBody>
           <a:bodyPr/>
           <a:lstStyle/>
           <a:p>
             <a:fld id="{E8FD0B7A-F5DD-4F40-B4CB-3B2C354B893A}" type="datetimeFigureOut">
-              <a:rPr lang="en-US" smtClean="0"/>
+              <a:rPr lang="en-US" smtClean="0">
+                <a:effectLst/>
+              </a:rPr>
               <a:t>Date</a:t>
             </a:fld>
-            <a:endParaRPr lang="en-US"/>
+            <a:endParaRPr lang="en-US">
+              <a:effectLst/>
+            </a:endParaRPr>
           </a:p>
         </p:txBody>
       </p:sp>
@@ -3359,12 +3537,16 @@
             <p:ph type="ftr" sz="quarter" idx="11"/>
           </p:nvPr>
         </p:nvSpPr>
-        <p:spPr/>
+        <p:spPr>
+          <a:effectLst/>
+        </p:spPr>
         <p:txBody>
           <a:bodyPr/>
           <a:lstStyle/>
           <a:p>
-            <a:endParaRPr lang="en-US"/>
+            <a:endParaRPr lang="en-US">
+              <a:effectLst/>
+            </a:endParaRPr>
           </a:p>
         </p:txBody>
       </p:sp>
@@ -3378,16 +3560,22 @@
             <p:ph type="sldNum" sz="quarter" idx="12"/>
           </p:nvPr>
         </p:nvSpPr>
-        <p:spPr/>
+        <p:spPr>
+          <a:effectLst/>
+        </p:spPr>
         <p:txBody>
           <a:bodyPr/>
           <a:lstStyle/>
           <a:p>
             <a:fld id="{93AE1883-0942-4AA3-9DB2-9C7C3A0314B1}" type="slidenum">
-              <a:rPr lang="en-US" smtClean="0"/>
+              <a:rPr lang="en-US" smtClean="0">
+                <a:effectLst/>
+              </a:rPr>
               <a:t>‹#›</a:t>
             </a:fld>
-            <a:endParaRPr lang="en-US"/>
+            <a:endParaRPr lang="en-US">
+              <a:effectLst/>
+            </a:endParaRPr>
           </a:p>
         </p:txBody>
       </p:sp>
@@ -3415,6 +3603,7 @@
           <a:off x="0" y="0"/>
           <a:ext cx="0" cy="0"/>
         </a:xfrm>
+        <a:effectLst/>
       </p:grpSpPr>
       <p:sp>
         <p:nvSpPr>
@@ -3431,20 +3620,27 @@
             <a:off x="722313" y="4406900"/>
             <a:ext cx="7772400" cy="1362075"/>
           </a:xfrm>
+          <a:effectLst/>
         </p:spPr>
         <p:txBody>
           <a:bodyPr anchor="t"/>
           <a:lstStyle>
             <a:lvl1pPr algn="l">
-              <a:defRPr sz="4000" b="1" cap="all"/>
+              <a:defRPr sz="4000" b="1" cap="all">
+                <a:effectLst/>
+              </a:defRPr>
             </a:lvl1pPr>
           </a:lstStyle>
           <a:p>
             <a:r>
-              <a:rPr lang="en-US" smtClean="0"/>
+              <a:rPr lang="en-US" smtClean="0">
+                <a:effectLst/>
+              </a:rPr>
               <a:t>Click to edit Master title style</a:t>
             </a:r>
-            <a:endParaRPr lang="en-US"/>
+            <a:endParaRPr lang="en-US">
+              <a:effectLst/>
+            </a:endParaRPr>
           </a:p>
         </p:txBody>
       </p:sp>
@@ -3463,6 +3659,7 @@
             <a:off x="722313" y="2906713"/>
             <a:ext cx="7772400" cy="1500187"/>
           </a:xfrm>
+          <a:effectLst/>
         </p:spPr>
         <p:txBody>
           <a:bodyPr anchor="b"/>
@@ -3475,6 +3672,7 @@
                     <a:tint val="75000"/>
                   </a:schemeClr>
                 </a:solidFill>
+                <a:effectLst/>
               </a:defRPr>
             </a:lvl1pPr>
             <a:lvl2pPr marL="457200" indent="0">
@@ -3485,6 +3683,7 @@
                     <a:tint val="75000"/>
                   </a:schemeClr>
                 </a:solidFill>
+                <a:effectLst/>
               </a:defRPr>
             </a:lvl2pPr>
             <a:lvl3pPr marL="914400" indent="0">
@@ -3495,6 +3694,7 @@
                     <a:tint val="75000"/>
                   </a:schemeClr>
                 </a:solidFill>
+                <a:effectLst/>
               </a:defRPr>
             </a:lvl3pPr>
             <a:lvl4pPr marL="1371600" indent="0">
@@ -3505,6 +3705,7 @@
                     <a:tint val="75000"/>
                   </a:schemeClr>
                 </a:solidFill>
+                <a:effectLst/>
               </a:defRPr>
             </a:lvl4pPr>
             <a:lvl5pPr marL="1828800" indent="0">
@@ -3515,6 +3716,7 @@
                     <a:tint val="75000"/>
                   </a:schemeClr>
                 </a:solidFill>
+                <a:effectLst/>
               </a:defRPr>
             </a:lvl5pPr>
             <a:lvl6pPr marL="2286000" indent="0">
@@ -3525,6 +3727,7 @@
                     <a:tint val="75000"/>
                   </a:schemeClr>
                 </a:solidFill>
+                <a:effectLst/>
               </a:defRPr>
             </a:lvl6pPr>
             <a:lvl7pPr marL="2743200" indent="0">
@@ -3535,6 +3738,7 @@
                     <a:tint val="75000"/>
                   </a:schemeClr>
                 </a:solidFill>
+                <a:effectLst/>
               </a:defRPr>
             </a:lvl7pPr>
             <a:lvl8pPr marL="3200400" indent="0">
@@ -3545,6 +3749,7 @@
                     <a:tint val="75000"/>
                   </a:schemeClr>
                 </a:solidFill>
+                <a:effectLst/>
               </a:defRPr>
             </a:lvl8pPr>
             <a:lvl9pPr marL="3657600" indent="0">
@@ -3555,13 +3760,16 @@
                     <a:tint val="75000"/>
                   </a:schemeClr>
                 </a:solidFill>
+                <a:effectLst/>
               </a:defRPr>
             </a:lvl9pPr>
           </a:lstStyle>
           <a:p>
             <a:pPr lvl="0"/>
             <a:r>
-              <a:rPr lang="en-US" smtClean="0"/>
+              <a:rPr lang="en-US" smtClean="0">
+                <a:effectLst/>
+              </a:rPr>
               <a:t>Click to edit Master text styles</a:t>
             </a:r>
           </a:p>
@@ -3577,16 +3785,22 @@
             <p:ph type="dt" sz="half" idx="10"/>
           </p:nvPr>
         </p:nvSpPr>
-        <p:spPr/>
+        <p:spPr>
+          <a:effectLst/>
+        </p:spPr>
         <p:txBody>
           <a:bodyPr/>
           <a:lstStyle/>
           <a:p>
             <a:fld id="{E8FD0B7A-F5DD-4F40-B4CB-3B2C354B893A}" type="datetimeFigureOut">
-              <a:rPr lang="en-US" smtClean="0"/>
+              <a:rPr lang="en-US" smtClean="0">
+                <a:effectLst/>
+              </a:rPr>
               <a:t>Date</a:t>
             </a:fld>
-            <a:endParaRPr lang="en-US"/>
+            <a:endParaRPr lang="en-US">
+              <a:effectLst/>
+            </a:endParaRPr>
           </a:p>
         </p:txBody>
       </p:sp>
@@ -3600,12 +3814,16 @@
             <p:ph type="ftr" sz="quarter" idx="11"/>
           </p:nvPr>
         </p:nvSpPr>
-        <p:spPr/>
+        <p:spPr>
+          <a:effectLst/>
+        </p:spPr>
         <p:txBody>
           <a:bodyPr/>
           <a:lstStyle/>
           <a:p>
-            <a:endParaRPr lang="en-US"/>
+            <a:endParaRPr lang="en-US">
+              <a:effectLst/>
+            </a:endParaRPr>
           </a:p>
         </p:txBody>
       </p:sp>
@@ -3619,16 +3837,22 @@
             <p:ph type="sldNum" sz="quarter" idx="12"/>
           </p:nvPr>
         </p:nvSpPr>
-        <p:spPr/>
+        <p:spPr>
+          <a:effectLst/>
+        </p:spPr>
         <p:txBody>
           <a:bodyPr/>
           <a:lstStyle/>
           <a:p>
             <a:fld id="{93AE1883-0942-4AA3-9DB2-9C7C3A0314B1}" type="slidenum">
-              <a:rPr lang="en-US" smtClean="0"/>
+              <a:rPr lang="en-US" smtClean="0">
+                <a:effectLst/>
+              </a:rPr>
               <a:t>‹#›</a:t>
             </a:fld>
-            <a:endParaRPr lang="en-US"/>
+            <a:endParaRPr lang="en-US">
+              <a:effectLst/>
+            </a:endParaRPr>
           </a:p>
         </p:txBody>
       </p:sp>
@@ -3656,6 +3880,7 @@
           <a:off x="0" y="0"/>
           <a:ext cx="0" cy="0"/>
         </a:xfrm>
+        <a:effectLst/>
       </p:grpSpPr>
       <p:sp>
         <p:nvSpPr>
@@ -3667,16 +3892,22 @@
             <p:ph type="title"/>
           </p:nvPr>
         </p:nvSpPr>
-        <p:spPr/>
+        <p:spPr>
+          <a:effectLst/>
+        </p:spPr>
         <p:txBody>
           <a:bodyPr/>
           <a:lstStyle/>
           <a:p>
             <a:r>
-              <a:rPr lang="en-US" smtClean="0"/>
+              <a:rPr lang="en-US" smtClean="0">
+                <a:effectLst/>
+              </a:rPr>
               <a:t>Click to edit Master title style</a:t>
             </a:r>
-            <a:endParaRPr lang="en-US"/>
+            <a:endParaRPr lang="en-US">
+              <a:effectLst/>
+            </a:endParaRPr>
           </a:p>
         </p:txBody>
       </p:sp>
@@ -3695,73 +3926,104 @@
             <a:off x="457200" y="1600200"/>
             <a:ext cx="4038600" cy="4525963"/>
           </a:xfrm>
+          <a:effectLst/>
         </p:spPr>
         <p:txBody>
           <a:bodyPr/>
           <a:lstStyle>
             <a:lvl1pPr>
-              <a:defRPr sz="2800"/>
+              <a:defRPr sz="2800">
+                <a:effectLst/>
+              </a:defRPr>
             </a:lvl1pPr>
             <a:lvl2pPr>
-              <a:defRPr sz="2400"/>
+              <a:defRPr sz="2400">
+                <a:effectLst/>
+              </a:defRPr>
             </a:lvl2pPr>
             <a:lvl3pPr>
-              <a:defRPr sz="2000"/>
+              <a:defRPr sz="2000">
+                <a:effectLst/>
+              </a:defRPr>
             </a:lvl3pPr>
             <a:lvl4pPr>
-              <a:defRPr sz="1800"/>
+              <a:defRPr sz="1800">
+                <a:effectLst/>
+              </a:defRPr>
             </a:lvl4pPr>
             <a:lvl5pPr>
-              <a:defRPr sz="1800"/>
+              <a:defRPr sz="1800">
+                <a:effectLst/>
+              </a:defRPr>
             </a:lvl5pPr>
             <a:lvl6pPr>
-              <a:defRPr sz="1800"/>
+              <a:defRPr sz="1800">
+                <a:effectLst/>
+              </a:defRPr>
             </a:lvl6pPr>
             <a:lvl7pPr>
-              <a:defRPr sz="1800"/>
+              <a:defRPr sz="1800">
+                <a:effectLst/>
+              </a:defRPr>
             </a:lvl7pPr>
             <a:lvl8pPr>
-              <a:defRPr sz="1800"/>
+              <a:defRPr sz="1800">
+                <a:effectLst/>
+              </a:defRPr>
             </a:lvl8pPr>
             <a:lvl9pPr>
-              <a:defRPr sz="1800"/>
+              <a:defRPr sz="1800">
+                <a:effectLst/>
+              </a:defRPr>
             </a:lvl9pPr>
           </a:lstStyle>
           <a:p>
             <a:pPr lvl="0"/>
             <a:r>
-              <a:rPr lang="en-US" smtClean="0"/>
+              <a:rPr lang="en-US" smtClean="0">
+                <a:effectLst/>
+              </a:rPr>
               <a:t>Click to edit Master text styles</a:t>
             </a:r>
           </a:p>
           <a:p>
             <a:pPr lvl="1"/>
             <a:r>
-              <a:rPr lang="en-US" smtClean="0"/>
+              <a:rPr lang="en-US" smtClean="0">
+                <a:effectLst/>
+              </a:rPr>
               <a:t>Second level</a:t>
             </a:r>
           </a:p>
           <a:p>
             <a:pPr lvl="2"/>
             <a:r>
-              <a:rPr lang="en-US" smtClean="0"/>
+              <a:rPr lang="en-US" smtClean="0">
+                <a:effectLst/>
+              </a:rPr>
               <a:t>Third level</a:t>
             </a:r>
           </a:p>
           <a:p>
             <a:pPr lvl="3"/>
             <a:r>
-              <a:rPr lang="en-US" smtClean="0"/>
+              <a:rPr lang="en-US" smtClean="0">
+                <a:effectLst/>
+              </a:rPr>
               <a:t>Fourth level</a:t>
             </a:r>
           </a:p>
           <a:p>
             <a:pPr lvl="4"/>
             <a:r>
-              <a:rPr lang="en-US" smtClean="0"/>
+              <a:rPr lang="en-US" smtClean="0">
+                <a:effectLst/>
+              </a:rPr>
               <a:t>Fifth level</a:t>
             </a:r>
-            <a:endParaRPr lang="en-US"/>
+            <a:endParaRPr lang="en-US">
+              <a:effectLst/>
+            </a:endParaRPr>
           </a:p>
         </p:txBody>
       </p:sp>
@@ -3780,73 +4042,104 @@
             <a:off x="4648200" y="1600200"/>
             <a:ext cx="4038600" cy="4525963"/>
           </a:xfrm>
+          <a:effectLst/>
         </p:spPr>
         <p:txBody>
           <a:bodyPr/>
           <a:lstStyle>
             <a:lvl1pPr>
-              <a:defRPr sz="2800"/>
+              <a:defRPr sz="2800">
+                <a:effectLst/>
+              </a:defRPr>
             </a:lvl1pPr>
             <a:lvl2pPr>
-              <a:defRPr sz="2400"/>
+              <a:defRPr sz="2400">
+                <a:effectLst/>
+              </a:defRPr>
             </a:lvl2pPr>
             <a:lvl3pPr>
-              <a:defRPr sz="2000"/>
+              <a:defRPr sz="2000">
+                <a:effectLst/>
+              </a:defRPr>
             </a:lvl3pPr>
             <a:lvl4pPr>
-              <a:defRPr sz="1800"/>
+              <a:defRPr sz="1800">
+                <a:effectLst/>
+              </a:defRPr>
             </a:lvl4pPr>
             <a:lvl5pPr>
-              <a:defRPr sz="1800"/>
+              <a:defRPr sz="1800">
+                <a:effectLst/>
+              </a:defRPr>
             </a:lvl5pPr>
             <a:lvl6pPr>
-              <a:defRPr sz="1800"/>
+              <a:defRPr sz="1800">
+                <a:effectLst/>
+              </a:defRPr>
             </a:lvl6pPr>
             <a:lvl7pPr>
-              <a:defRPr sz="1800"/>
+              <a:defRPr sz="1800">
+                <a:effectLst/>
+              </a:defRPr>
             </a:lvl7pPr>
             <a:lvl8pPr>
-              <a:defRPr sz="1800"/>
+              <a:defRPr sz="1800">
+                <a:effectLst/>
+              </a:defRPr>
             </a:lvl8pPr>
             <a:lvl9pPr>
-              <a:defRPr sz="1800"/>
+              <a:defRPr sz="1800">
+                <a:effectLst/>
+              </a:defRPr>
             </a:lvl9pPr>
           </a:lstStyle>
           <a:p>
             <a:pPr lvl="0"/>
             <a:r>
-              <a:rPr lang="en-US" smtClean="0"/>
+              <a:rPr lang="en-US" smtClean="0">
+                <a:effectLst/>
+              </a:rPr>
               <a:t>Click to edit Master text styles</a:t>
             </a:r>
           </a:p>
           <a:p>
             <a:pPr lvl="1"/>
             <a:r>
-              <a:rPr lang="en-US" smtClean="0"/>
+              <a:rPr lang="en-US" smtClean="0">
+                <a:effectLst/>
+              </a:rPr>
               <a:t>Second level</a:t>
             </a:r>
           </a:p>
           <a:p>
             <a:pPr lvl="2"/>
             <a:r>
-              <a:rPr lang="en-US" smtClean="0"/>
+              <a:rPr lang="en-US" smtClean="0">
+                <a:effectLst/>
+              </a:rPr>
               <a:t>Third level</a:t>
             </a:r>
           </a:p>
           <a:p>
             <a:pPr lvl="3"/>
             <a:r>
-              <a:rPr lang="en-US" smtClean="0"/>
+              <a:rPr lang="en-US" smtClean="0">
+                <a:effectLst/>
+              </a:rPr>
               <a:t>Fourth level</a:t>
             </a:r>
           </a:p>
           <a:p>
             <a:pPr lvl="4"/>
             <a:r>
-              <a:rPr lang="en-US" smtClean="0"/>
+              <a:rPr lang="en-US" smtClean="0">
+                <a:effectLst/>
+              </a:rPr>
               <a:t>Fifth level</a:t>
             </a:r>
-            <a:endParaRPr lang="en-US"/>
+            <a:endParaRPr lang="en-US">
+              <a:effectLst/>
+            </a:endParaRPr>
           </a:p>
         </p:txBody>
       </p:sp>
@@ -3860,16 +4153,22 @@
             <p:ph type="dt" sz="half" idx="10"/>
           </p:nvPr>
         </p:nvSpPr>
-        <p:spPr/>
+        <p:spPr>
+          <a:effectLst/>
+        </p:spPr>
         <p:txBody>
           <a:bodyPr/>
           <a:lstStyle/>
           <a:p>
             <a:fld id="{E8FD0B7A-F5DD-4F40-B4CB-3B2C354B893A}" type="datetimeFigureOut">
-              <a:rPr lang="en-US" smtClean="0"/>
+              <a:rPr lang="en-US" smtClean="0">
+                <a:effectLst/>
+              </a:rPr>
               <a:t>Date</a:t>
             </a:fld>
-            <a:endParaRPr lang="en-US"/>
+            <a:endParaRPr lang="en-US">
+              <a:effectLst/>
+            </a:endParaRPr>
           </a:p>
         </p:txBody>
       </p:sp>
@@ -3883,12 +4182,16 @@
             <p:ph type="ftr" sz="quarter" idx="11"/>
           </p:nvPr>
         </p:nvSpPr>
-        <p:spPr/>
+        <p:spPr>
+          <a:effectLst/>
+        </p:spPr>
         <p:txBody>
           <a:bodyPr/>
           <a:lstStyle/>
           <a:p>
-            <a:endParaRPr lang="en-US"/>
+            <a:endParaRPr lang="en-US">
+              <a:effectLst/>
+            </a:endParaRPr>
           </a:p>
         </p:txBody>
       </p:sp>
@@ -3902,16 +4205,22 @@
             <p:ph type="sldNum" sz="quarter" idx="12"/>
           </p:nvPr>
         </p:nvSpPr>
-        <p:spPr/>
+        <p:spPr>
+          <a:effectLst/>
+        </p:spPr>
         <p:txBody>
           <a:bodyPr/>
           <a:lstStyle/>
           <a:p>
             <a:fld id="{93AE1883-0942-4AA3-9DB2-9C7C3A0314B1}" type="slidenum">
-              <a:rPr lang="en-US" smtClean="0"/>
+              <a:rPr lang="en-US" smtClean="0">
+                <a:effectLst/>
+              </a:rPr>
               <a:t>‹#›</a:t>
             </a:fld>
-            <a:endParaRPr lang="en-US"/>
+            <a:endParaRPr lang="en-US">
+              <a:effectLst/>
+            </a:endParaRPr>
           </a:p>
         </p:txBody>
       </p:sp>
@@ -3939,6 +4248,7 @@
           <a:off x="0" y="0"/>
           <a:ext cx="0" cy="0"/>
         </a:xfrm>
+        <a:effectLst/>
       </p:grpSpPr>
       <p:sp>
         <p:nvSpPr>
@@ -3950,16 +4260,22 @@
             <p:ph type="title"/>
           </p:nvPr>
         </p:nvSpPr>
-        <p:spPr/>
+        <p:spPr>
+          <a:effectLst/>
+        </p:spPr>
         <p:txBody>
           <a:bodyPr/>
           <a:lstStyle/>
           <a:p>
             <a:r>
-              <a:rPr lang="en-US" smtClean="0"/>
+              <a:rPr lang="en-US" smtClean="0">
+                <a:effectLst/>
+              </a:rPr>
               <a:t>Click to edit Master title style</a:t>
             </a:r>
-            <a:endParaRPr lang="en-US"/>
+            <a:endParaRPr lang="en-US">
+              <a:effectLst/>
+            </a:endParaRPr>
           </a:p>
         </p:txBody>
       </p:sp>
@@ -3978,51 +4294,72 @@
             <a:off x="457200" y="1535113"/>
             <a:ext cx="4040188" cy="639762"/>
           </a:xfrm>
+          <a:effectLst/>
         </p:spPr>
         <p:txBody>
           <a:bodyPr anchor="b"/>
           <a:lstStyle>
             <a:lvl1pPr marL="0" indent="0">
               <a:buNone/>
-              <a:defRPr sz="2400" b="1"/>
+              <a:defRPr sz="2400" b="1">
+                <a:effectLst/>
+              </a:defRPr>
             </a:lvl1pPr>
             <a:lvl2pPr marL="457200" indent="0">
               <a:buNone/>
-              <a:defRPr sz="2000" b="1"/>
+              <a:defRPr sz="2000" b="1">
+                <a:effectLst/>
+              </a:defRPr>
             </a:lvl2pPr>
             <a:lvl3pPr marL="914400" indent="0">
               <a:buNone/>
-              <a:defRPr sz="1800" b="1"/>
+              <a:defRPr sz="1800" b="1">
+                <a:effectLst/>
+              </a:defRPr>
             </a:lvl3pPr>
             <a:lvl4pPr marL="1371600" indent="0">
               <a:buNone/>
-              <a:defRPr sz="1600" b="1"/>
+              <a:defRPr sz="1600" b="1">
+                <a:effectLst/>
+              </a:defRPr>
             </a:lvl4pPr>
             <a:lvl5pPr marL="1828800" indent="0">
               <a:buNone/>
-              <a:defRPr sz="1600" b="1"/>
+              <a:defRPr sz="1600" b="1">
+                <a:effectLst/>
+              </a:defRPr>
             </a:lvl5pPr>
             <a:lvl6pPr marL="2286000" indent="0">
               <a:buNone/>
-              <a:defRPr sz="1600" b="1"/>
+              <a:defRPr sz="1600" b="1">
+                <a:effectLst/>
+              </a:defRPr>
             </a:lvl6pPr>
             <a:lvl7pPr marL="2743200" indent="0">
               <a:buNone/>
-              <a:defRPr sz="1600" b="1"/>
+              <a:defRPr sz="1600" b="1">
+                <a:effectLst/>
+              </a:defRPr>
             </a:lvl7pPr>
             <a:lvl8pPr marL="3200400" indent="0">
               <a:buNone/>
-              <a:defRPr sz="1600" b="1"/>
+              <a:defRPr sz="1600" b="1">
+                <a:effectLst/>
+              </a:defRPr>
             </a:lvl8pPr>
             <a:lvl9pPr marL="3657600" indent="0">
               <a:buNone/>
-              <a:defRPr sz="1600" b="1"/>
+              <a:defRPr sz="1600" b="1">
+                <a:effectLst/>
+              </a:defRPr>
             </a:lvl9pPr>
           </a:lstStyle>
           <a:p>
             <a:pPr lvl="0"/>
             <a:r>
-              <a:rPr lang="en-US" smtClean="0"/>
+              <a:rPr lang="en-US" smtClean="0">
+                <a:effectLst/>
+              </a:rPr>
               <a:t>Click to edit Master text styles</a:t>
             </a:r>
           </a:p>
@@ -4043,73 +4380,104 @@
             <a:off x="457200" y="2174875"/>
             <a:ext cx="4040188" cy="3951288"/>
           </a:xfrm>
+          <a:effectLst/>
         </p:spPr>
         <p:txBody>
           <a:bodyPr/>
           <a:lstStyle>
             <a:lvl1pPr>
-              <a:defRPr sz="2400"/>
+              <a:defRPr sz="2400">
+                <a:effectLst/>
+              </a:defRPr>
             </a:lvl1pPr>
             <a:lvl2pPr>
-              <a:defRPr sz="2000"/>
+              <a:defRPr sz="2000">
+                <a:effectLst/>
+              </a:defRPr>
             </a:lvl2pPr>
             <a:lvl3pPr>
-              <a:defRPr sz="1800"/>
+              <a:defRPr sz="1800">
+                <a:effectLst/>
+              </a:defRPr>
             </a:lvl3pPr>
             <a:lvl4pPr>
-              <a:defRPr sz="1600"/>
+              <a:defRPr sz="1600">
+                <a:effectLst/>
+              </a:defRPr>
             </a:lvl4pPr>
             <a:lvl5pPr>
-              <a:defRPr sz="1600"/>
+              <a:defRPr sz="1600">
+                <a:effectLst/>
+              </a:defRPr>
             </a:lvl5pPr>
             <a:lvl6pPr>
-              <a:defRPr sz="1600"/>
+              <a:defRPr sz="1600">
+                <a:effectLst/>
+              </a:defRPr>
             </a:lvl6pPr>
             <a:lvl7pPr>
-              <a:defRPr sz="1600"/>
+              <a:defRPr sz="1600">
+                <a:effectLst/>
+              </a:defRPr>
             </a:lvl7pPr>
             <a:lvl8pPr>
-              <a:defRPr sz="1600"/>
+              <a:defRPr sz="1600">
+                <a:effectLst/>
+              </a:defRPr>
             </a:lvl8pPr>
             <a:lvl9pPr>
-              <a:defRPr sz="1600"/>
+              <a:defRPr sz="1600">
+                <a:effectLst/>
+              </a:defRPr>
             </a:lvl9pPr>
           </a:lstStyle>
           <a:p>
             <a:pPr lvl="0"/>
             <a:r>
-              <a:rPr lang="en-US" smtClean="0"/>
+              <a:rPr lang="en-US" smtClean="0">
+                <a:effectLst/>
+              </a:rPr>
               <a:t>Click to edit Master text styles</a:t>
             </a:r>
           </a:p>
           <a:p>
             <a:pPr lvl="1"/>
             <a:r>
-              <a:rPr lang="en-US" smtClean="0"/>
+              <a:rPr lang="en-US" smtClean="0">
+                <a:effectLst/>
+              </a:rPr>
               <a:t>Second level</a:t>
             </a:r>
           </a:p>
           <a:p>
             <a:pPr lvl="2"/>
             <a:r>
-              <a:rPr lang="en-US" smtClean="0"/>
+              <a:rPr lang="en-US" smtClean="0">
+                <a:effectLst/>
+              </a:rPr>
               <a:t>Third level</a:t>
             </a:r>
           </a:p>
           <a:p>
             <a:pPr lvl="3"/>
             <a:r>
-              <a:rPr lang="en-US" smtClean="0"/>
+              <a:rPr lang="en-US" smtClean="0">
+                <a:effectLst/>
+              </a:rPr>
               <a:t>Fourth level</a:t>
             </a:r>
           </a:p>
           <a:p>
             <a:pPr lvl="4"/>
             <a:r>
-              <a:rPr lang="en-US" smtClean="0"/>
+              <a:rPr lang="en-US" smtClean="0">
+                <a:effectLst/>
+              </a:rPr>
               <a:t>Fifth level</a:t>
             </a:r>
-            <a:endParaRPr lang="en-US"/>
+            <a:endParaRPr lang="en-US">
+              <a:effectLst/>
+            </a:endParaRPr>
           </a:p>
         </p:txBody>
       </p:sp>
@@ -4128,51 +4496,72 @@
             <a:off x="4645025" y="1535113"/>
             <a:ext cx="4041775" cy="639762"/>
           </a:xfrm>
+          <a:effectLst/>
         </p:spPr>
         <p:txBody>
           <a:bodyPr anchor="b"/>
           <a:lstStyle>
             <a:lvl1pPr marL="0" indent="0">
               <a:buNone/>
-              <a:defRPr sz="2400" b="1"/>
+              <a:defRPr sz="2400" b="1">
+                <a:effectLst/>
+              </a:defRPr>
             </a:lvl1pPr>
             <a:lvl2pPr marL="457200" indent="0">
               <a:buNone/>
-              <a:defRPr sz="2000" b="1"/>
+              <a:defRPr sz="2000" b="1">
+                <a:effectLst/>
+              </a:defRPr>
             </a:lvl2pPr>
             <a:lvl3pPr marL="914400" indent="0">
               <a:buNone/>
-              <a:defRPr sz="1800" b="1"/>
+              <a:defRPr sz="1800" b="1">
+                <a:effectLst/>
+              </a:defRPr>
             </a:lvl3pPr>
             <a:lvl4pPr marL="1371600" indent="0">
               <a:buNone/>
-              <a:defRPr sz="1600" b="1"/>
+              <a:defRPr sz="1600" b="1">
+                <a:effectLst/>
+              </a:defRPr>
             </a:lvl4pPr>
             <a:lvl5pPr marL="1828800" indent="0">
               <a:buNone/>
-              <a:defRPr sz="1600" b="1"/>
+              <a:defRPr sz="1600" b="1">
+                <a:effectLst/>
+              </a:defRPr>
             </a:lvl5pPr>
             <a:lvl6pPr marL="2286000" indent="0">
               <a:buNone/>
-              <a:defRPr sz="1600" b="1"/>
+              <a:defRPr sz="1600" b="1">
+                <a:effectLst/>
+              </a:defRPr>
             </a:lvl6pPr>
             <a:lvl7pPr marL="2743200" indent="0">
               <a:buNone/>
-              <a:defRPr sz="1600" b="1"/>
+              <a:defRPr sz="1600" b="1">
+                <a:effectLst/>
+              </a:defRPr>
             </a:lvl7pPr>
             <a:lvl8pPr marL="3200400" indent="0">
               <a:buNone/>
-              <a:defRPr sz="1600" b="1"/>
+              <a:defRPr sz="1600" b="1">
+                <a:effectLst/>
+              </a:defRPr>
             </a:lvl8pPr>
             <a:lvl9pPr marL="3657600" indent="0">
               <a:buNone/>
-              <a:defRPr sz="1600" b="1"/>
+              <a:defRPr sz="1600" b="1">
+                <a:effectLst/>
+              </a:defRPr>
             </a:lvl9pPr>
           </a:lstStyle>
           <a:p>
             <a:pPr lvl="0"/>
             <a:r>
-              <a:rPr lang="en-US" smtClean="0"/>
+              <a:rPr lang="en-US" smtClean="0">
+                <a:effectLst/>
+              </a:rPr>
               <a:t>Click to edit Master text styles</a:t>
             </a:r>
           </a:p>
@@ -4193,73 +4582,104 @@
             <a:off x="4645025" y="2174875"/>
             <a:ext cx="4041775" cy="3951288"/>
           </a:xfrm>
+          <a:effectLst/>
         </p:spPr>
         <p:txBody>
           <a:bodyPr/>
           <a:lstStyle>
             <a:lvl1pPr>
-              <a:defRPr sz="2400"/>
+              <a:defRPr sz="2400">
+                <a:effectLst/>
+              </a:defRPr>
             </a:lvl1pPr>
             <a:lvl2pPr>
-              <a:defRPr sz="2000"/>
+              <a:defRPr sz="2000">
+                <a:effectLst/>
+              </a:defRPr>
             </a:lvl2pPr>
             <a:lvl3pPr>
-              <a:defRPr sz="1800"/>
+              <a:defRPr sz="1800">
+                <a:effectLst/>
+              </a:defRPr>
             </a:lvl3pPr>
             <a:lvl4pPr>
-              <a:defRPr sz="1600"/>
+              <a:defRPr sz="1600">
+                <a:effectLst/>
+              </a:defRPr>
             </a:lvl4pPr>
             <a:lvl5pPr>
-              <a:defRPr sz="1600"/>
+              <a:defRPr sz="1600">
+                <a:effectLst/>
+              </a:defRPr>
             </a:lvl5pPr>
             <a:lvl6pPr>
-              <a:defRPr sz="1600"/>
+              <a:defRPr sz="1600">
+                <a:effectLst/>
+              </a:defRPr>
             </a:lvl6pPr>
             <a:lvl7pPr>
-              <a:defRPr sz="1600"/>
+              <a:defRPr sz="1600">
+                <a:effectLst/>
+              </a:defRPr>
             </a:lvl7pPr>
             <a:lvl8pPr>
-              <a:defRPr sz="1600"/>
+              <a:defRPr sz="1600">
+                <a:effectLst/>
+              </a:defRPr>
             </a:lvl8pPr>
             <a:lvl9pPr>
-              <a:defRPr sz="1600"/>
+              <a:defRPr sz="1600">
+                <a:effectLst/>
+              </a:defRPr>
             </a:lvl9pPr>
           </a:lstStyle>
           <a:p>
             <a:pPr lvl="0"/>
             <a:r>
-              <a:rPr lang="en-US" smtClean="0"/>
+              <a:rPr lang="en-US" smtClean="0">
+                <a:effectLst/>
+              </a:rPr>
               <a:t>Click to edit Master text styles</a:t>
             </a:r>
           </a:p>
           <a:p>
             <a:pPr lvl="1"/>
             <a:r>
-              <a:rPr lang="en-US" smtClean="0"/>
+              <a:rPr lang="en-US" smtClean="0">
+                <a:effectLst/>
+              </a:rPr>
               <a:t>Second level</a:t>
             </a:r>
           </a:p>
           <a:p>
             <a:pPr lvl="2"/>
             <a:r>
-              <a:rPr lang="en-US" smtClean="0"/>
+              <a:rPr lang="en-US" smtClean="0">
+                <a:effectLst/>
+              </a:rPr>
               <a:t>Third level</a:t>
             </a:r>
           </a:p>
           <a:p>
             <a:pPr lvl="3"/>
             <a:r>
-              <a:rPr lang="en-US" smtClean="0"/>
+              <a:rPr lang="en-US" smtClean="0">
+                <a:effectLst/>
+              </a:rPr>
               <a:t>Fourth level</a:t>
             </a:r>
           </a:p>
           <a:p>
             <a:pPr lvl="4"/>
             <a:r>
-              <a:rPr lang="en-US" smtClean="0"/>
+              <a:rPr lang="en-US" smtClean="0">
+                <a:effectLst/>
+              </a:rPr>
               <a:t>Fifth level</a:t>
             </a:r>
-            <a:endParaRPr lang="en-US"/>
+            <a:endParaRPr lang="en-US">
+              <a:effectLst/>
+            </a:endParaRPr>
           </a:p>
         </p:txBody>
       </p:sp>
@@ -4273,16 +4693,22 @@
             <p:ph type="dt" sz="half" idx="10"/>
           </p:nvPr>
         </p:nvSpPr>
-        <p:spPr/>
+        <p:spPr>
+          <a:effectLst/>
+        </p:spPr>
         <p:txBody>
           <a:bodyPr/>
           <a:lstStyle/>
           <a:p>
             <a:fld id="{E8FD0B7A-F5DD-4F40-B4CB-3B2C354B893A}" type="datetimeFigureOut">
-              <a:rPr lang="en-US" smtClean="0"/>
+              <a:rPr lang="en-US" smtClean="0">
+                <a:effectLst/>
+              </a:rPr>
               <a:t>Date</a:t>
             </a:fld>
-            <a:endParaRPr lang="en-US"/>
+            <a:endParaRPr lang="en-US">
+              <a:effectLst/>
+            </a:endParaRPr>
           </a:p>
         </p:txBody>
       </p:sp>
@@ -4296,12 +4722,16 @@
             <p:ph type="ftr" sz="quarter" idx="11"/>
           </p:nvPr>
         </p:nvSpPr>
-        <p:spPr/>
+        <p:spPr>
+          <a:effectLst/>
+        </p:spPr>
         <p:txBody>
           <a:bodyPr/>
           <a:lstStyle/>
           <a:p>
-            <a:endParaRPr lang="en-US"/>
+            <a:endParaRPr lang="en-US">
+              <a:effectLst/>
+            </a:endParaRPr>
           </a:p>
         </p:txBody>
       </p:sp>
@@ -4315,16 +4745,22 @@
             <p:ph type="sldNum" sz="quarter" idx="12"/>
           </p:nvPr>
         </p:nvSpPr>
-        <p:spPr/>
+        <p:spPr>
+          <a:effectLst/>
+        </p:spPr>
         <p:txBody>
           <a:bodyPr/>
           <a:lstStyle/>
           <a:p>
             <a:fld id="{93AE1883-0942-4AA3-9DB2-9C7C3A0314B1}" type="slidenum">
-              <a:rPr lang="en-US" smtClean="0"/>
+              <a:rPr lang="en-US" smtClean="0">
+                <a:effectLst/>
+              </a:rPr>
               <a:t>‹#›</a:t>
             </a:fld>
-            <a:endParaRPr lang="en-US"/>
+            <a:endParaRPr lang="en-US">
+              <a:effectLst/>
+            </a:endParaRPr>
           </a:p>
         </p:txBody>
       </p:sp>
@@ -4352,6 +4788,7 @@
           <a:off x="0" y="0"/>
           <a:ext cx="0" cy="0"/>
         </a:xfrm>
+        <a:effectLst/>
       </p:grpSpPr>
       <p:sp>
         <p:nvSpPr>
@@ -4363,16 +4800,22 @@
             <p:ph type="title"/>
           </p:nvPr>
         </p:nvSpPr>
-        <p:spPr/>
+        <p:spPr>
+          <a:effectLst/>
+        </p:spPr>
         <p:txBody>
           <a:bodyPr/>
           <a:lstStyle/>
           <a:p>
             <a:r>
-              <a:rPr lang="en-US" smtClean="0"/>
+              <a:rPr lang="en-US" smtClean="0">
+                <a:effectLst/>
+              </a:rPr>
               <a:t>Click to edit Master title style</a:t>
             </a:r>
-            <a:endParaRPr lang="en-US"/>
+            <a:endParaRPr lang="en-US">
+              <a:effectLst/>
+            </a:endParaRPr>
           </a:p>
         </p:txBody>
       </p:sp>
@@ -4386,16 +4829,22 @@
             <p:ph type="dt" sz="half" idx="10"/>
           </p:nvPr>
         </p:nvSpPr>
-        <p:spPr/>
+        <p:spPr>
+          <a:effectLst/>
+        </p:spPr>
         <p:txBody>
           <a:bodyPr/>
           <a:lstStyle/>
           <a:p>
             <a:fld id="{E8FD0B7A-F5DD-4F40-B4CB-3B2C354B893A}" type="datetimeFigureOut">
-              <a:rPr lang="en-US" smtClean="0"/>
+              <a:rPr lang="en-US" smtClean="0">
+                <a:effectLst/>
+              </a:rPr>
               <a:t>Date</a:t>
             </a:fld>
-            <a:endParaRPr lang="en-US"/>
+            <a:endParaRPr lang="en-US">
+              <a:effectLst/>
+            </a:endParaRPr>
           </a:p>
         </p:txBody>
       </p:sp>
@@ -4409,12 +4858,16 @@
             <p:ph type="ftr" sz="quarter" idx="11"/>
           </p:nvPr>
         </p:nvSpPr>
-        <p:spPr/>
+        <p:spPr>
+          <a:effectLst/>
+        </p:spPr>
         <p:txBody>
           <a:bodyPr/>
           <a:lstStyle/>
           <a:p>
-            <a:endParaRPr lang="en-US"/>
+            <a:endParaRPr lang="en-US">
+              <a:effectLst/>
+            </a:endParaRPr>
           </a:p>
         </p:txBody>
       </p:sp>
@@ -4428,16 +4881,22 @@
             <p:ph type="sldNum" sz="quarter" idx="12"/>
           </p:nvPr>
         </p:nvSpPr>
-        <p:spPr/>
+        <p:spPr>
+          <a:effectLst/>
+        </p:spPr>
         <p:txBody>
           <a:bodyPr/>
           <a:lstStyle/>
           <a:p>
             <a:fld id="{93AE1883-0942-4AA3-9DB2-9C7C3A0314B1}" type="slidenum">
-              <a:rPr lang="en-US" smtClean="0"/>
+              <a:rPr lang="en-US" smtClean="0">
+                <a:effectLst/>
+              </a:rPr>
               <a:t>‹#›</a:t>
             </a:fld>
-            <a:endParaRPr lang="en-US"/>
+            <a:endParaRPr lang="en-US">
+              <a:effectLst/>
+            </a:endParaRPr>
           </a:p>
         </p:txBody>
       </p:sp>
@@ -4465,6 +4924,7 @@
           <a:off x="0" y="0"/>
           <a:ext cx="0" cy="0"/>
         </a:xfrm>
+        <a:effectLst/>
       </p:grpSpPr>
       <p:sp>
         <p:nvSpPr>
@@ -4476,16 +4936,22 @@
             <p:ph type="dt" sz="half" idx="10"/>
           </p:nvPr>
         </p:nvSpPr>
-        <p:spPr/>
+        <p:spPr>
+          <a:effectLst/>
+        </p:spPr>
         <p:txBody>
           <a:bodyPr/>
           <a:lstStyle/>
           <a:p>
             <a:fld id="{E8FD0B7A-F5DD-4F40-B4CB-3B2C354B893A}" type="datetimeFigureOut">
-              <a:rPr lang="en-US" smtClean="0"/>
+              <a:rPr lang="en-US" smtClean="0">
+                <a:effectLst/>
+              </a:rPr>
               <a:t>Date</a:t>
             </a:fld>
-            <a:endParaRPr lang="en-US"/>
+            <a:endParaRPr lang="en-US">
+              <a:effectLst/>
+            </a:endParaRPr>
           </a:p>
         </p:txBody>
       </p:sp>
@@ -4499,12 +4965,16 @@
             <p:ph type="ftr" sz="quarter" idx="11"/>
           </p:nvPr>
         </p:nvSpPr>
-        <p:spPr/>
+        <p:spPr>
+          <a:effectLst/>
+        </p:spPr>
         <p:txBody>
           <a:bodyPr/>
           <a:lstStyle/>
           <a:p>
-            <a:endParaRPr lang="en-US"/>
+            <a:endParaRPr lang="en-US">
+              <a:effectLst/>
+            </a:endParaRPr>
           </a:p>
         </p:txBody>
       </p:sp>
@@ -4518,16 +4988,22 @@
             <p:ph type="sldNum" sz="quarter" idx="12"/>
           </p:nvPr>
         </p:nvSpPr>
-        <p:spPr/>
+        <p:spPr>
+          <a:effectLst/>
+        </p:spPr>
         <p:txBody>
           <a:bodyPr/>
           <a:lstStyle/>
           <a:p>
             <a:fld id="{93AE1883-0942-4AA3-9DB2-9C7C3A0314B1}" type="slidenum">
-              <a:rPr lang="en-US" smtClean="0"/>
+              <a:rPr lang="en-US" smtClean="0">
+                <a:effectLst/>
+              </a:rPr>
               <a:t>‹#›</a:t>
             </a:fld>
-            <a:endParaRPr lang="en-US"/>
+            <a:endParaRPr lang="en-US">
+              <a:effectLst/>
+            </a:endParaRPr>
           </a:p>
         </p:txBody>
       </p:sp>
@@ -4555,6 +5031,7 @@
           <a:off x="0" y="0"/>
           <a:ext cx="0" cy="0"/>
         </a:xfrm>
+        <a:effectLst/>
       </p:grpSpPr>
       <p:sp>
         <p:nvSpPr>
@@ -4571,20 +5048,27 @@
             <a:off x="457200" y="273050"/>
             <a:ext cx="3008313" cy="1162050"/>
           </a:xfrm>
+          <a:effectLst/>
         </p:spPr>
         <p:txBody>
           <a:bodyPr anchor="b"/>
           <a:lstStyle>
             <a:lvl1pPr algn="l">
-              <a:defRPr sz="2000" b="1"/>
+              <a:defRPr sz="2000" b="1">
+                <a:effectLst/>
+              </a:defRPr>
             </a:lvl1pPr>
           </a:lstStyle>
           <a:p>
             <a:r>
-              <a:rPr lang="en-US" smtClean="0"/>
+              <a:rPr lang="en-US" smtClean="0">
+                <a:effectLst/>
+              </a:rPr>
               <a:t>Click to edit Master title style</a:t>
             </a:r>
-            <a:endParaRPr lang="en-US"/>
+            <a:endParaRPr lang="en-US">
+              <a:effectLst/>
+            </a:endParaRPr>
           </a:p>
         </p:txBody>
       </p:sp>
@@ -4603,73 +5087,104 @@
             <a:off x="3575050" y="273050"/>
             <a:ext cx="5111750" cy="5853113"/>
           </a:xfrm>
+          <a:effectLst/>
         </p:spPr>
         <p:txBody>
           <a:bodyPr/>
           <a:lstStyle>
             <a:lvl1pPr>
-              <a:defRPr sz="3200"/>
+              <a:defRPr sz="3200">
+                <a:effectLst/>
+              </a:defRPr>
             </a:lvl1pPr>
             <a:lvl2pPr>
-              <a:defRPr sz="2800"/>
+              <a:defRPr sz="2800">
+                <a:effectLst/>
+              </a:defRPr>
             </a:lvl2pPr>
             <a:lvl3pPr>
-              <a:defRPr sz="2400"/>
+              <a:defRPr sz="2400">
+                <a:effectLst/>
+              </a:defRPr>
             </a:lvl3pPr>
             <a:lvl4pPr>
-              <a:defRPr sz="2000"/>
+              <a:defRPr sz="2000">
+                <a:effectLst/>
+              </a:defRPr>
             </a:lvl4pPr>
             <a:lvl5pPr>
-              <a:defRPr sz="2000"/>
+              <a:defRPr sz="2000">
+                <a:effectLst/>
+              </a:defRPr>
             </a:lvl5pPr>
             <a:lvl6pPr>
-              <a:defRPr sz="2000"/>
+              <a:defRPr sz="2000">
+                <a:effectLst/>
+              </a:defRPr>
             </a:lvl6pPr>
             <a:lvl7pPr>
-              <a:defRPr sz="2000"/>
+              <a:defRPr sz="2000">
+                <a:effectLst/>
+              </a:defRPr>
             </a:lvl7pPr>
             <a:lvl8pPr>
-              <a:defRPr sz="2000"/>
+              <a:defRPr sz="2000">
+                <a:effectLst/>
+              </a:defRPr>
             </a:lvl8pPr>
             <a:lvl9pPr>
-              <a:defRPr sz="2000"/>
+              <a:defRPr sz="2000">
+                <a:effectLst/>
+              </a:defRPr>
             </a:lvl9pPr>
           </a:lstStyle>
           <a:p>
             <a:pPr lvl="0"/>
             <a:r>
-              <a:rPr lang="en-US" smtClean="0"/>
+              <a:rPr lang="en-US" smtClean="0">
+                <a:effectLst/>
+              </a:rPr>
               <a:t>Click to edit Master text styles</a:t>
             </a:r>
           </a:p>
           <a:p>
             <a:pPr lvl="1"/>
             <a:r>
-              <a:rPr lang="en-US" smtClean="0"/>
+              <a:rPr lang="en-US" smtClean="0">
+                <a:effectLst/>
+              </a:rPr>
               <a:t>Second level</a:t>
             </a:r>
           </a:p>
           <a:p>
             <a:pPr lvl="2"/>
             <a:r>
-              <a:rPr lang="en-US" smtClean="0"/>
+              <a:rPr lang="en-US" smtClean="0">
+                <a:effectLst/>
+              </a:rPr>
               <a:t>Third level</a:t>
             </a:r>
           </a:p>
           <a:p>
             <a:pPr lvl="3"/>
             <a:r>
-              <a:rPr lang="en-US" smtClean="0"/>
+              <a:rPr lang="en-US" smtClean="0">
+                <a:effectLst/>
+              </a:rPr>
               <a:t>Fourth level</a:t>
             </a:r>
           </a:p>
           <a:p>
             <a:pPr lvl="4"/>
             <a:r>
-              <a:rPr lang="en-US" smtClean="0"/>
+              <a:rPr lang="en-US" smtClean="0">
+                <a:effectLst/>
+              </a:rPr>
               <a:t>Fifth level</a:t>
             </a:r>
-            <a:endParaRPr lang="en-US"/>
+            <a:endParaRPr lang="en-US">
+              <a:effectLst/>
+            </a:endParaRPr>
           </a:p>
         </p:txBody>
       </p:sp>
@@ -4688,51 +5203,72 @@
             <a:off x="457200" y="1435100"/>
             <a:ext cx="3008313" cy="4691063"/>
           </a:xfrm>
+          <a:effectLst/>
         </p:spPr>
         <p:txBody>
           <a:bodyPr/>
           <a:lstStyle>
             <a:lvl1pPr marL="0" indent="0">
               <a:buNone/>
-              <a:defRPr sz="1400"/>
+              <a:defRPr sz="1400">
+                <a:effectLst/>
+              </a:defRPr>
             </a:lvl1pPr>
             <a:lvl2pPr marL="457200" indent="0">
               <a:buNone/>
-              <a:defRPr sz="1200"/>
+              <a:defRPr sz="1200">
+                <a:effectLst/>
+              </a:defRPr>
             </a:lvl2pPr>
             <a:lvl3pPr marL="914400" indent="0">
               <a:buNone/>
-              <a:defRPr sz="1000"/>
+              <a:defRPr sz="1000">
+                <a:effectLst/>
+              </a:defRPr>
             </a:lvl3pPr>
             <a:lvl4pPr marL="1371600" indent="0">
               <a:buNone/>
-              <a:defRPr sz="900"/>
+              <a:defRPr sz="900">
+                <a:effectLst/>
+              </a:defRPr>
             </a:lvl4pPr>
             <a:lvl5pPr marL="1828800" indent="0">
               <a:buNone/>
-              <a:defRPr sz="900"/>
+              <a:defRPr sz="900">
+                <a:effectLst/>
+              </a:defRPr>
             </a:lvl5pPr>
             <a:lvl6pPr marL="2286000" indent="0">
               <a:buNone/>
-              <a:defRPr sz="900"/>
+              <a:defRPr sz="900">
+                <a:effectLst/>
+              </a:defRPr>
             </a:lvl6pPr>
             <a:lvl7pPr marL="2743200" indent="0">
               <a:buNone/>
-              <a:defRPr sz="900"/>
+              <a:defRPr sz="900">
+                <a:effectLst/>
+              </a:defRPr>
             </a:lvl7pPr>
             <a:lvl8pPr marL="3200400" indent="0">
               <a:buNone/>
-              <a:defRPr sz="900"/>
+              <a:defRPr sz="900">
+                <a:effectLst/>
+              </a:defRPr>
             </a:lvl8pPr>
             <a:lvl9pPr marL="3657600" indent="0">
               <a:buNone/>
-              <a:defRPr sz="900"/>
+              <a:defRPr sz="900">
+                <a:effectLst/>
+              </a:defRPr>
             </a:lvl9pPr>
           </a:lstStyle>
           <a:p>
             <a:pPr lvl="0"/>
             <a:r>
-              <a:rPr lang="en-US" smtClean="0"/>
+              <a:rPr lang="en-US" smtClean="0">
+                <a:effectLst/>
+              </a:rPr>
               <a:t>Click to edit Master text styles</a:t>
             </a:r>
           </a:p>
@@ -4748,16 +5284,22 @@
             <p:ph type="dt" sz="half" idx="10"/>
           </p:nvPr>
         </p:nvSpPr>
-        <p:spPr/>
+        <p:spPr>
+          <a:effectLst/>
+        </p:spPr>
         <p:txBody>
           <a:bodyPr/>
           <a:lstStyle/>
           <a:p>
             <a:fld id="{E8FD0B7A-F5DD-4F40-B4CB-3B2C354B893A}" type="datetimeFigureOut">
-              <a:rPr lang="en-US" smtClean="0"/>
+              <a:rPr lang="en-US" smtClean="0">
+                <a:effectLst/>
+              </a:rPr>
               <a:t>Date</a:t>
             </a:fld>
-            <a:endParaRPr lang="en-US"/>
+            <a:endParaRPr lang="en-US">
+              <a:effectLst/>
+            </a:endParaRPr>
           </a:p>
         </p:txBody>
       </p:sp>
@@ -4771,12 +5313,16 @@
             <p:ph type="ftr" sz="quarter" idx="11"/>
           </p:nvPr>
         </p:nvSpPr>
-        <p:spPr/>
+        <p:spPr>
+          <a:effectLst/>
+        </p:spPr>
         <p:txBody>
           <a:bodyPr/>
           <a:lstStyle/>
           <a:p>
-            <a:endParaRPr lang="en-US"/>
+            <a:endParaRPr lang="en-US">
+              <a:effectLst/>
+            </a:endParaRPr>
           </a:p>
         </p:txBody>
       </p:sp>
@@ -4790,16 +5336,22 @@
             <p:ph type="sldNum" sz="quarter" idx="12"/>
           </p:nvPr>
         </p:nvSpPr>
-        <p:spPr/>
+        <p:spPr>
+          <a:effectLst/>
+        </p:spPr>
         <p:txBody>
           <a:bodyPr/>
           <a:lstStyle/>
           <a:p>
             <a:fld id="{93AE1883-0942-4AA3-9DB2-9C7C3A0314B1}" type="slidenum">
-              <a:rPr lang="en-US" smtClean="0"/>
+              <a:rPr lang="en-US" smtClean="0">
+                <a:effectLst/>
+              </a:rPr>
               <a:t>‹#›</a:t>
             </a:fld>
-            <a:endParaRPr lang="en-US"/>
+            <a:endParaRPr lang="en-US">
+              <a:effectLst/>
+            </a:endParaRPr>
           </a:p>
         </p:txBody>
       </p:sp>
@@ -4827,6 +5379,7 @@
           <a:off x="0" y="0"/>
           <a:ext cx="0" cy="0"/>
         </a:xfrm>
+        <a:effectLst/>
       </p:grpSpPr>
       <p:sp>
         <p:nvSpPr>
@@ -4843,20 +5396,27 @@
             <a:off x="1792288" y="4800600"/>
             <a:ext cx="5486400" cy="566738"/>
           </a:xfrm>
+          <a:effectLst/>
         </p:spPr>
         <p:txBody>
           <a:bodyPr anchor="b"/>
           <a:lstStyle>
             <a:lvl1pPr algn="l">
-              <a:defRPr sz="2000" b="1"/>
+              <a:defRPr sz="2000" b="1">
+                <a:effectLst/>
+              </a:defRPr>
             </a:lvl1pPr>
           </a:lstStyle>
           <a:p>
             <a:r>
-              <a:rPr lang="en-US" smtClean="0"/>
+              <a:rPr lang="en-US" smtClean="0">
+                <a:effectLst/>
+              </a:rPr>
               <a:t>Click to edit Master title style</a:t>
             </a:r>
-            <a:endParaRPr lang="en-US"/>
+            <a:endParaRPr lang="en-US">
+              <a:effectLst/>
+            </a:endParaRPr>
           </a:p>
         </p:txBody>
       </p:sp>
@@ -4875,49 +5435,70 @@
             <a:off x="1792288" y="612775"/>
             <a:ext cx="5486400" cy="4114800"/>
           </a:xfrm>
+          <a:effectLst/>
         </p:spPr>
         <p:txBody>
           <a:bodyPr/>
           <a:lstStyle>
             <a:lvl1pPr marL="0" indent="0">
               <a:buNone/>
-              <a:defRPr sz="3200"/>
+              <a:defRPr sz="3200">
+                <a:effectLst/>
+              </a:defRPr>
             </a:lvl1pPr>
             <a:lvl2pPr marL="457200" indent="0">
               <a:buNone/>
-              <a:defRPr sz="2800"/>
+              <a:defRPr sz="2800">
+                <a:effectLst/>
+              </a:defRPr>
             </a:lvl2pPr>
             <a:lvl3pPr marL="914400" indent="0">
               <a:buNone/>
-              <a:defRPr sz="2400"/>
+              <a:defRPr sz="2400">
+                <a:effectLst/>
+              </a:defRPr>
             </a:lvl3pPr>
             <a:lvl4pPr marL="1371600" indent="0">
               <a:buNone/>
-              <a:defRPr sz="2000"/>
+              <a:defRPr sz="2000">
+                <a:effectLst/>
+              </a:defRPr>
             </a:lvl4pPr>
             <a:lvl5pPr marL="1828800" indent="0">
               <a:buNone/>
-              <a:defRPr sz="2000"/>
+              <a:defRPr sz="2000">
+                <a:effectLst/>
+              </a:defRPr>
             </a:lvl5pPr>
             <a:lvl6pPr marL="2286000" indent="0">
               <a:buNone/>
-              <a:defRPr sz="2000"/>
+              <a:defRPr sz="2000">
+                <a:effectLst/>
+              </a:defRPr>
             </a:lvl6pPr>
             <a:lvl7pPr marL="2743200" indent="0">
               <a:buNone/>
-              <a:defRPr sz="2000"/>
+              <a:defRPr sz="2000">
+                <a:effectLst/>
+              </a:defRPr>
             </a:lvl7pPr>
             <a:lvl8pPr marL="3200400" indent="0">
               <a:buNone/>
-              <a:defRPr sz="2000"/>
+              <a:defRPr sz="2000">
+                <a:effectLst/>
+              </a:defRPr>
             </a:lvl8pPr>
             <a:lvl9pPr marL="3657600" indent="0">
               <a:buNone/>
-              <a:defRPr sz="2000"/>
+              <a:defRPr sz="2000">
+                <a:effectLst/>
+              </a:defRPr>
             </a:lvl9pPr>
           </a:lstStyle>
           <a:p>
-            <a:endParaRPr lang="en-US"/>
+            <a:endParaRPr lang="en-US">
+              <a:effectLst/>
+            </a:endParaRPr>
           </a:p>
         </p:txBody>
       </p:sp>
@@ -4936,51 +5517,72 @@
             <a:off x="1792288" y="5367338"/>
             <a:ext cx="5486400" cy="804862"/>
           </a:xfrm>
+          <a:effectLst/>
         </p:spPr>
         <p:txBody>
           <a:bodyPr/>
           <a:lstStyle>
             <a:lvl1pPr marL="0" indent="0">
               <a:buNone/>
-              <a:defRPr sz="1400"/>
+              <a:defRPr sz="1400">
+                <a:effectLst/>
+              </a:defRPr>
             </a:lvl1pPr>
             <a:lvl2pPr marL="457200" indent="0">
               <a:buNone/>
-              <a:defRPr sz="1200"/>
+              <a:defRPr sz="1200">
+                <a:effectLst/>
+              </a:defRPr>
             </a:lvl2pPr>
             <a:lvl3pPr marL="914400" indent="0">
               <a:buNone/>
-              <a:defRPr sz="1000"/>
+              <a:defRPr sz="1000">
+                <a:effectLst/>
+              </a:defRPr>
             </a:lvl3pPr>
             <a:lvl4pPr marL="1371600" indent="0">
               <a:buNone/>
-              <a:defRPr sz="900"/>
+              <a:defRPr sz="900">
+                <a:effectLst/>
+              </a:defRPr>
             </a:lvl4pPr>
             <a:lvl5pPr marL="1828800" indent="0">
               <a:buNone/>
-              <a:defRPr sz="900"/>
+              <a:defRPr sz="900">
+                <a:effectLst/>
+              </a:defRPr>
             </a:lvl5pPr>
             <a:lvl6pPr marL="2286000" indent="0">
               <a:buNone/>
-              <a:defRPr sz="900"/>
+              <a:defRPr sz="900">
+                <a:effectLst/>
+              </a:defRPr>
             </a:lvl6pPr>
             <a:lvl7pPr marL="2743200" indent="0">
               <a:buNone/>
-              <a:defRPr sz="900"/>
+              <a:defRPr sz="900">
+                <a:effectLst/>
+              </a:defRPr>
             </a:lvl7pPr>
             <a:lvl8pPr marL="3200400" indent="0">
               <a:buNone/>
-              <a:defRPr sz="900"/>
+              <a:defRPr sz="900">
+                <a:effectLst/>
+              </a:defRPr>
             </a:lvl8pPr>
             <a:lvl9pPr marL="3657600" indent="0">
               <a:buNone/>
-              <a:defRPr sz="900"/>
+              <a:defRPr sz="900">
+                <a:effectLst/>
+              </a:defRPr>
             </a:lvl9pPr>
           </a:lstStyle>
           <a:p>
             <a:pPr lvl="0"/>
             <a:r>
-              <a:rPr lang="en-US" smtClean="0"/>
+              <a:rPr lang="en-US" smtClean="0">
+                <a:effectLst/>
+              </a:rPr>
               <a:t>Click to edit Master text styles</a:t>
             </a:r>
           </a:p>
@@ -4996,16 +5598,22 @@
             <p:ph type="dt" sz="half" idx="10"/>
           </p:nvPr>
         </p:nvSpPr>
-        <p:spPr/>
+        <p:spPr>
+          <a:effectLst/>
+        </p:spPr>
         <p:txBody>
           <a:bodyPr/>
           <a:lstStyle/>
           <a:p>
             <a:fld id="{E8FD0B7A-F5DD-4F40-B4CB-3B2C354B893A}" type="datetimeFigureOut">
-              <a:rPr lang="en-US" smtClean="0"/>
+              <a:rPr lang="en-US" smtClean="0">
+                <a:effectLst/>
+              </a:rPr>
               <a:t>Date</a:t>
             </a:fld>
-            <a:endParaRPr lang="en-US"/>
+            <a:endParaRPr lang="en-US">
+              <a:effectLst/>
+            </a:endParaRPr>
           </a:p>
         </p:txBody>
       </p:sp>
@@ -5019,12 +5627,16 @@
             <p:ph type="ftr" sz="quarter" idx="11"/>
           </p:nvPr>
         </p:nvSpPr>
-        <p:spPr/>
+        <p:spPr>
+          <a:effectLst/>
+        </p:spPr>
         <p:txBody>
           <a:bodyPr/>
           <a:lstStyle/>
           <a:p>
-            <a:endParaRPr lang="en-US"/>
+            <a:endParaRPr lang="en-US">
+              <a:effectLst/>
+            </a:endParaRPr>
           </a:p>
         </p:txBody>
       </p:sp>
@@ -5038,16 +5650,22 @@
             <p:ph type="sldNum" sz="quarter" idx="12"/>
           </p:nvPr>
         </p:nvSpPr>
-        <p:spPr/>
+        <p:spPr>
+          <a:effectLst/>
+        </p:spPr>
         <p:txBody>
           <a:bodyPr/>
           <a:lstStyle/>
           <a:p>
             <a:fld id="{93AE1883-0942-4AA3-9DB2-9C7C3A0314B1}" type="slidenum">
-              <a:rPr lang="en-US" smtClean="0"/>
+              <a:rPr lang="en-US" smtClean="0">
+                <a:effectLst/>
+              </a:rPr>
               <a:t>‹#›</a:t>
             </a:fld>
-            <a:endParaRPr lang="en-US"/>
+            <a:endParaRPr lang="en-US">
+              <a:effectLst/>
+            </a:endParaRPr>
           </a:p>
         </p:txBody>
       </p:sp>
@@ -5080,6 +5698,7 @@
           <a:off x="0" y="0"/>
           <a:ext cx="0" cy="0"/>
         </a:xfrm>
+        <a:effectLst/>
       </p:grpSpPr>
       <p:sp>
         <p:nvSpPr>
@@ -5099,6 +5718,7 @@
           <a:prstGeom prst="rect">
             <a:avLst/>
           </a:prstGeom>
+          <a:effectLst/>
         </p:spPr>
         <p:txBody>
           <a:bodyPr vert="horz" lIns="91440" tIns="45720" rIns="91440" bIns="45720" rtlCol="0" anchor="ctr">
@@ -5107,10 +5727,14 @@
           <a:lstStyle/>
           <a:p>
             <a:r>
-              <a:rPr lang="en-US" smtClean="0"/>
+              <a:rPr lang="en-US" smtClean="0">
+                <a:effectLst/>
+              </a:rPr>
               <a:t>Click to edit Master title style</a:t>
             </a:r>
-            <a:endParaRPr lang="en-US"/>
+            <a:endParaRPr lang="en-US">
+              <a:effectLst/>
+            </a:endParaRPr>
           </a:p>
         </p:txBody>
       </p:sp>
@@ -5132,6 +5756,7 @@
           <a:prstGeom prst="rect">
             <a:avLst/>
           </a:prstGeom>
+          <a:effectLst/>
         </p:spPr>
         <p:txBody>
           <a:bodyPr vert="horz" lIns="91440" tIns="45720" rIns="91440" bIns="45720" rtlCol="0">
@@ -5141,38 +5766,50 @@
           <a:p>
             <a:pPr lvl="0"/>
             <a:r>
-              <a:rPr lang="en-US" smtClean="0"/>
+              <a:rPr lang="en-US" smtClean="0">
+                <a:effectLst/>
+              </a:rPr>
               <a:t>Click to edit Master text styles</a:t>
             </a:r>
           </a:p>
           <a:p>
             <a:pPr lvl="1"/>
             <a:r>
-              <a:rPr lang="en-US" smtClean="0"/>
+              <a:rPr lang="en-US" smtClean="0">
+                <a:effectLst/>
+              </a:rPr>
               <a:t>Second level</a:t>
             </a:r>
           </a:p>
           <a:p>
             <a:pPr lvl="2"/>
             <a:r>
-              <a:rPr lang="en-US" smtClean="0"/>
+              <a:rPr lang="en-US" smtClean="0">
+                <a:effectLst/>
+              </a:rPr>
               <a:t>Third level</a:t>
             </a:r>
           </a:p>
           <a:p>
             <a:pPr lvl="3"/>
             <a:r>
-              <a:rPr lang="en-US" smtClean="0"/>
+              <a:rPr lang="en-US" smtClean="0">
+                <a:effectLst/>
+              </a:rPr>
               <a:t>Fourth level</a:t>
             </a:r>
           </a:p>
           <a:p>
             <a:pPr lvl="4"/>
             <a:r>
-              <a:rPr lang="en-US" smtClean="0"/>
+              <a:rPr lang="en-US" smtClean="0">
+                <a:effectLst/>
+              </a:rPr>
               <a:t>Fifth level</a:t>
             </a:r>
-            <a:endParaRPr lang="en-US"/>
+            <a:endParaRPr lang="en-US">
+              <a:effectLst/>
+            </a:endParaRPr>
           </a:p>
         </p:txBody>
       </p:sp>
@@ -5194,6 +5831,7 @@
           <a:prstGeom prst="rect">
             <a:avLst/>
           </a:prstGeom>
+          <a:effectLst/>
         </p:spPr>
         <p:txBody>
           <a:bodyPr vert="horz" lIns="91440" tIns="45720" rIns="91440" bIns="45720" rtlCol="0" anchor="ctr"/>
@@ -5205,15 +5843,20 @@
                     <a:tint val="75000"/>
                   </a:schemeClr>
                 </a:solidFill>
+                <a:effectLst/>
               </a:defRPr>
             </a:lvl1pPr>
           </a:lstStyle>
           <a:p>
             <a:fld id="{E8FD0B7A-F5DD-4F40-B4CB-3B2C354B893A}" type="datetimeFigureOut">
-              <a:rPr lang="en-US" smtClean="0"/>
+              <a:rPr lang="en-US" smtClean="0">
+                <a:effectLst/>
+              </a:rPr>
               <a:t>11/7/2009</a:t>
             </a:fld>
-            <a:endParaRPr lang="en-US"/>
+            <a:endParaRPr lang="en-US">
+              <a:effectLst/>
+            </a:endParaRPr>
           </a:p>
         </p:txBody>
       </p:sp>
@@ -5235,6 +5878,7 @@
           <a:prstGeom prst="rect">
             <a:avLst/>
           </a:prstGeom>
+          <a:effectLst/>
         </p:spPr>
         <p:txBody>
           <a:bodyPr vert="horz" lIns="91440" tIns="45720" rIns="91440" bIns="45720" rtlCol="0" anchor="ctr"/>
@@ -5246,11 +5890,14 @@
                     <a:tint val="75000"/>
                   </a:schemeClr>
                 </a:solidFill>
+                <a:effectLst/>
               </a:defRPr>
             </a:lvl1pPr>
           </a:lstStyle>
           <a:p>
-            <a:endParaRPr lang="en-US"/>
+            <a:endParaRPr lang="en-US">
+              <a:effectLst/>
+            </a:endParaRPr>
           </a:p>
         </p:txBody>
       </p:sp>
@@ -5272,6 +5919,7 @@
           <a:prstGeom prst="rect">
             <a:avLst/>
           </a:prstGeom>
+          <a:effectLst/>
         </p:spPr>
         <p:txBody>
           <a:bodyPr vert="horz" lIns="91440" tIns="45720" rIns="91440" bIns="45720" rtlCol="0" anchor="ctr"/>
@@ -5283,15 +5931,20 @@
                     <a:tint val="75000"/>
                   </a:schemeClr>
                 </a:solidFill>
+                <a:effectLst/>
               </a:defRPr>
             </a:lvl1pPr>
           </a:lstStyle>
           <a:p>
             <a:fld id="{93AE1883-0942-4AA3-9DB2-9C7C3A0314B1}" type="slidenum">
-              <a:rPr lang="en-US" smtClean="0"/>
+              <a:rPr lang="en-US" smtClean="0">
+                <a:effectLst/>
+              </a:rPr>
               <a:t>‹#›</a:t>
             </a:fld>
-            <a:endParaRPr lang="en-US"/>
+            <a:endParaRPr lang="en-US">
+              <a:effectLst/>
+            </a:endParaRPr>
           </a:p>
         </p:txBody>
       </p:sp>
@@ -5324,6 +5977,7 @@
           <a:solidFill>
             <a:schemeClr val="tx1"/>
           </a:solidFill>
+          <a:effectLst/>
           <a:latin typeface="+mj-lt"/>
           <a:ea typeface="+mj-ea"/>
           <a:cs typeface="+mj-cs"/>
@@ -5341,6 +5995,7 @@
           <a:solidFill>
             <a:schemeClr val="tx1"/>
           </a:solidFill>
+          <a:effectLst/>
           <a:latin typeface="+mn-lt"/>
           <a:ea typeface="+mn-ea"/>
           <a:cs typeface="+mn-cs"/>
@@ -5356,6 +6011,7 @@
           <a:solidFill>
             <a:schemeClr val="tx1"/>
           </a:solidFill>
+          <a:effectLst/>
           <a:latin typeface="+mn-lt"/>
           <a:ea typeface="+mn-ea"/>
           <a:cs typeface="+mn-cs"/>
@@ -5371,6 +6027,7 @@
           <a:solidFill>
             <a:schemeClr val="tx1"/>
           </a:solidFill>
+          <a:effectLst/>
           <a:latin typeface="+mn-lt"/>
           <a:ea typeface="+mn-ea"/>
           <a:cs typeface="+mn-cs"/>
@@ -5386,6 +6043,7 @@
           <a:solidFill>
             <a:schemeClr val="tx1"/>
           </a:solidFill>
+          <a:effectLst/>
           <a:latin typeface="+mn-lt"/>
           <a:ea typeface="+mn-ea"/>
           <a:cs typeface="+mn-cs"/>
@@ -5401,6 +6059,7 @@
           <a:solidFill>
             <a:schemeClr val="tx1"/>
           </a:solidFill>
+          <a:effectLst/>
           <a:latin typeface="+mn-lt"/>
           <a:ea typeface="+mn-ea"/>
           <a:cs typeface="+mn-cs"/>
@@ -5416,6 +6075,7 @@
           <a:solidFill>
             <a:schemeClr val="tx1"/>
           </a:solidFill>
+          <a:effectLst/>
           <a:latin typeface="+mn-lt"/>
           <a:ea typeface="+mn-ea"/>
           <a:cs typeface="+mn-cs"/>
@@ -5431,6 +6091,7 @@
           <a:solidFill>
             <a:schemeClr val="tx1"/>
           </a:solidFill>
+          <a:effectLst/>
           <a:latin typeface="+mn-lt"/>
           <a:ea typeface="+mn-ea"/>
           <a:cs typeface="+mn-cs"/>
@@ -5446,6 +6107,7 @@
           <a:solidFill>
             <a:schemeClr val="tx1"/>
           </a:solidFill>
+          <a:effectLst/>
           <a:latin typeface="+mn-lt"/>
           <a:ea typeface="+mn-ea"/>
           <a:cs typeface="+mn-cs"/>
@@ -5461,6 +6123,7 @@
           <a:solidFill>
             <a:schemeClr val="tx1"/>
           </a:solidFill>
+          <a:effectLst/>
           <a:latin typeface="+mn-lt"/>
           <a:ea typeface="+mn-ea"/>
           <a:cs typeface="+mn-cs"/>
@@ -5469,13 +6132,16 @@
     </p:bodyStyle>
     <p:otherStyle>
       <a:defPPr>
-        <a:defRPr lang="en-US"/>
+        <a:defRPr lang="en-US">
+          <a:effectLst/>
+        </a:defRPr>
       </a:defPPr>
       <a:lvl1pPr marL="0" algn="l" defTabSz="914400" rtl="0" eaLnBrk="1" latinLnBrk="0" hangingPunct="1">
         <a:defRPr sz="1800" kern="1200">
           <a:solidFill>
             <a:schemeClr val="tx1"/>
           </a:solidFill>
+          <a:effectLst/>
           <a:latin typeface="+mn-lt"/>
           <a:ea typeface="+mn-ea"/>
           <a:cs typeface="+mn-cs"/>
@@ -5486,6 +6152,7 @@
           <a:solidFill>
             <a:schemeClr val="tx1"/>
           </a:solidFill>
+          <a:effectLst/>
           <a:latin typeface="+mn-lt"/>
           <a:ea typeface="+mn-ea"/>
           <a:cs typeface="+mn-cs"/>
@@ -5496,6 +6163,7 @@
           <a:solidFill>
             <a:schemeClr val="tx1"/>
           </a:solidFill>
+          <a:effectLst/>
           <a:latin typeface="+mn-lt"/>
           <a:ea typeface="+mn-ea"/>
           <a:cs typeface="+mn-cs"/>
@@ -5506,6 +6174,7 @@
           <a:solidFill>
             <a:schemeClr val="tx1"/>
           </a:solidFill>
+          <a:effectLst/>
           <a:latin typeface="+mn-lt"/>
           <a:ea typeface="+mn-ea"/>
           <a:cs typeface="+mn-cs"/>
@@ -5516,6 +6185,7 @@
           <a:solidFill>
             <a:schemeClr val="tx1"/>
           </a:solidFill>
+          <a:effectLst/>
           <a:latin typeface="+mn-lt"/>
           <a:ea typeface="+mn-ea"/>
           <a:cs typeface="+mn-cs"/>
@@ -5526,6 +6196,7 @@
           <a:solidFill>
             <a:schemeClr val="tx1"/>
           </a:solidFill>
+          <a:effectLst/>
           <a:latin typeface="+mn-lt"/>
           <a:ea typeface="+mn-ea"/>
           <a:cs typeface="+mn-cs"/>
@@ -5536,6 +6207,7 @@
           <a:solidFill>
             <a:schemeClr val="tx1"/>
           </a:solidFill>
+          <a:effectLst/>
           <a:latin typeface="+mn-lt"/>
           <a:ea typeface="+mn-ea"/>
           <a:cs typeface="+mn-cs"/>
@@ -5546,6 +6218,7 @@
           <a:solidFill>
             <a:schemeClr val="tx1"/>
           </a:solidFill>
+          <a:effectLst/>
           <a:latin typeface="+mn-lt"/>
           <a:ea typeface="+mn-ea"/>
           <a:cs typeface="+mn-cs"/>
@@ -5556,6 +6229,7 @@
           <a:solidFill>
             <a:schemeClr val="tx1"/>
           </a:solidFill>
+          <a:effectLst/>
           <a:latin typeface="+mn-lt"/>
           <a:ea typeface="+mn-ea"/>
           <a:cs typeface="+mn-cs"/>
@@ -5580,6 +6254,7 @@
           <a:off x="0" y="0"/>
           <a:ext cx="0" cy="0"/>
         </a:xfrm>
+        <a:effectLst/>
       </p:grpSpPr>
       <p:graphicFrame>
         <p:nvGraphicFramePr>
@@ -5600,6 +6275,78 @@
       <p:sp>
         <p:nvSpPr>
           <p:cNvPr id="3" name="TextBox"/>
+          <p:cNvSpPr txBox="1">
+            <a:spLocks noGrp="1" noSelect="1" noRot="1" noMove="1"/>
+          </p:cNvSpPr>
+          <p:nvPr/>
+        </p:nvSpPr>
+        <p:spPr>
+          <a:xfrm>
+            <a:off x="1366520" y="2644140"/>
+            <a:ext cx="6411372" cy="1569660"/>
+          </a:xfrm>
+          <a:prstGeom prst="rect">
+            <a:avLst/>
+          </a:prstGeom>
+          <a:noFill/>
+          <a:effectLst/>
+        </p:spPr>
+        <p:txBody>
+          <a:bodyPr wrap="none" rtlCol="0" anchor="ctr" anchorCtr="1">
+            <a:spAutoFit/>
+          </a:bodyPr>
+          <a:lstStyle>
+            <a:lvl1pPr algn="l">
+              <a:lnSpc>
+                <a:spcPct val="150000"/>
+              </a:lnSpc>
+              <a:spcBef>
+                <a:spcPct val="0"/>
+              </a:spcBef>
+              <a:spcAft>
+                <a:spcPct val="0"/>
+              </a:spcAft>
+              <a:defRPr lang="en-US" sz="3200" b="1" noProof="1">
+                <a:solidFill>
+                  <a:prstClr val="red">
+                    <a:lumOff val="30000"/>
+                    <a:alpha val="40000"/>
+                  </a:prstClr>
+                </a:solidFill>
+                <a:effectLst>
+                  <a:outerShdw blurRad="50800" dist="38100" algn="tr" rotWithShape="0">
+                    <a:prstClr val="black">
+                      <a:alpha val="80000"/>
+                    </a:prstClr>
+                  </a:outerShdw>
+                </a:effectLst>
+                <a:latin typeface="Calibri" pitchFamily="34" charset="0"/>
+              </a:defRPr>
+            </a:lvl1pPr>
+          </a:lstStyle>
+          <a:p>
+            <a:pPr algn="ctr"/>
+            <a:r>
+              <a:t>Evaluation only.</a:t>
+            </a:r>
+          </a:p>
+          <a:p>
+            <a:pPr algn="ctr"/>
+            <a:r>
+              <a:t>Created with Aspose.Slides for Java 14.7.0.0</a:t>
+            </a:r>
+          </a:p>
+          <a:p>
+            <a:pPr algn="ctr"/>
+            <a:r>
+              <a:t>Copyright 2004-2014 Aspose Pty Ltd.</a:t>
+            </a:r>
+          </a:p>
+        </p:txBody>
+      </p:sp>
+      <p:sp>
+        <p:nvSpPr>
+          <p:cNvPr id="4" name="TextBox"/>
           <p:cNvSpPr txBox="1">
             <a:spLocks noGrp="1" noSelect="1" noRot="1" noMove="1"/>
           </p:cNvSpPr>
@@ -5657,13 +6404,13 @@
           <a:p>
             <a:pPr algn="ctr"/>
             <a:r>
-              <a:t>Created with Aspose.Slides for Java 14.7.0.0</a:t>
+              <a:t>Created with Aspose.Slides for Java 15.5.0.0</a:t>
             </a:r>
           </a:p>
           <a:p>
             <a:pPr algn="ctr"/>
             <a:r>
-              <a:t>Copyright 2004-2014 Aspose Pty Ltd.</a:t>
+              <a:t>Copyright 2004-2015 Aspose Pty Ltd.</a:t>
             </a:r>
           </a:p>
         </p:txBody>
@@ -5680,9 +6427,9 @@
 
 <file path=ppt/tags/tag1.xml><?xml version="1.0" encoding="utf-8"?>
 <p:tagLst xmlns:p="http://schemas.openxmlformats.org/presentationml/2006/main">
-  <p:tag name="AS_RELEASE_DATE" val="2014.09.29"/>
+  <p:tag name="AS_RELEASE_DATE" val="2015.06.24"/>
   <p:tag name="AS_TITLE" val="Aspose.Slides for Java"/>
-  <p:tag name="AS_VERSION" val="14.7.0.0"/>
+  <p:tag name="AS_VERSION" val="15.5.0.0"/>
 </p:tagLst>
 </file>
 
@@ -5730,8 +6477,8 @@
     <a:fontScheme name="Office">
       <a:majorFont>
         <a:latin typeface="Calibri"/>
-        <a:ea typeface=""/>
-        <a:cs typeface=""/>
+        <a:ea typeface="Arial"/>
+        <a:cs typeface="Arial"/>
         <a:font script="Jpan" typeface="ＭＳ%20Ｐゴシック"/>
         <a:font script="Hang" typeface="맑은%20고딕"/>
         <a:font script="Hans" typeface="宋体"/>
@@ -5765,8 +6512,8 @@
       </a:majorFont>
       <a:minorFont>
         <a:latin typeface="Calibri"/>
-        <a:ea typeface=""/>
-        <a:cs typeface=""/>
+        <a:ea typeface="Arial"/>
+        <a:cs typeface="Arial"/>
         <a:font script="Jpan" typeface="ＭＳ%20Ｐゴシック"/>
         <a:font script="Hang" typeface="맑은%20고딕"/>
         <a:font script="Hans" typeface="宋体"/>
@@ -5826,6 +6573,7 @@
             </a:gs>
           </a:gsLst>
           <a:lin ang="16200000" scaled="1"/>
+          <a:tileRect/>
         </a:gradFill>
         <a:gradFill rotWithShape="1">
           <a:gsLst>
@@ -5849,6 +6597,7 @@
             </a:gs>
           </a:gsLst>
           <a:lin ang="16200000" scaled="0"/>
+          <a:tileRect/>
         </a:gradFill>
       </a:fillStyleLst>
       <a:lnStyleLst>
@@ -5911,6 +6660,12 @@
           </a:scene3d>
           <a:sp3d>
             <a:bevelT w="63500" h="25400"/>
+            <a:extrusionClr>
+              <a:prstClr val="black"/>
+            </a:extrusionClr>
+            <a:contourClr>
+              <a:prstClr val="black"/>
+            </a:contourClr>
           </a:sp3d>
         </a:effectStyle>
       </a:effectStyleLst>
@@ -5943,6 +6698,7 @@
           <a:path path="circle">
             <a:fillToRect l="50000" t="-80000" r="50000" b="180000"/>
           </a:path>
+          <a:tileRect/>
         </a:gradFill>
         <a:gradFill rotWithShape="1">
           <a:gsLst>
@@ -5962,6 +6718,7 @@
           <a:path path="circle">
             <a:fillToRect l="50000" t="50000" r="50000" b="50000"/>
           </a:path>
+          <a:tileRect/>
         </a:gradFill>
       </a:bgFillStyleLst>
     </a:fmtScheme>

</xml_diff>